<commit_message>
Added another autopsy link
</commit_message>
<xml_diff>
--- a/slides/classthree/slides.pptx
+++ b/slides/classthree/slides.pptx
@@ -9338,11 +9338,7 @@
           <a:p>
             <a:r>
               <a:rPr lang="en-US" dirty="0" smtClean="0"/>
-              <a:t>Anatomy of a </a:t>
-            </a:r>
-            <a:r>
-              <a:rPr lang="en-US" dirty="0" smtClean="0"/>
-              <a:t>Rule</a:t>
+              <a:t>Anatomy of a Rule</a:t>
             </a:r>
             <a:endParaRPr lang="en-US" dirty="0"/>
           </a:p>
@@ -9378,11 +9374,6 @@
               </a:rPr>
               <a:t>selector</a:t>
             </a:r>
-            <a:endParaRPr lang="en-US" dirty="0" smtClean="0">
-              <a:solidFill>
-                <a:srgbClr val="FDA023"/>
-              </a:solidFill>
-            </a:endParaRPr>
           </a:p>
           <a:p>
             <a:r>
@@ -9393,11 +9384,6 @@
               </a:rPr>
               <a:t>property</a:t>
             </a:r>
-            <a:endParaRPr lang="en-US" dirty="0" smtClean="0">
-              <a:solidFill>
-                <a:srgbClr val="64A73B"/>
-              </a:solidFill>
-            </a:endParaRPr>
           </a:p>
           <a:p>
             <a:r>
@@ -9408,11 +9394,6 @@
               </a:rPr>
               <a:t>property value</a:t>
             </a:r>
-            <a:endParaRPr lang="en-US" dirty="0" smtClean="0">
-              <a:solidFill>
-                <a:schemeClr val="tx2"/>
-              </a:solidFill>
-            </a:endParaRPr>
           </a:p>
         </p:txBody>
       </p:sp>
@@ -9624,11 +9605,7 @@
             </a:r>
             <a:r>
               <a:rPr lang="en-US" sz="2800" dirty="0" smtClean="0"/>
-              <a:t> </a:t>
-            </a:r>
-            <a:r>
-              <a:rPr lang="en-US" sz="2800" dirty="0" smtClean="0"/>
-              <a:t>{ </a:t>
+              <a:t> { </a:t>
             </a:r>
             <a:r>
               <a:rPr lang="en-US" sz="2800" dirty="0" smtClean="0">
@@ -9652,13 +9629,8 @@
             </a:r>
             <a:r>
               <a:rPr lang="en-US" sz="2800" dirty="0" smtClean="0"/>
-              <a:t>; </a:t>
-            </a:r>
-            <a:r>
-              <a:rPr lang="en-US" sz="2800" dirty="0" smtClean="0"/>
-              <a:t>}</a:t>
-            </a:r>
-            <a:endParaRPr lang="en-US" sz="2800" dirty="0" smtClean="0"/>
+              <a:t>; }</a:t>
+            </a:r>
           </a:p>
           <a:p>
             <a:pPr marL="0" indent="0">
@@ -9866,7 +9838,6 @@
               <a:rPr lang="en-US" sz="2800" dirty="0" smtClean="0"/>
               <a:t>; }</a:t>
             </a:r>
-            <a:endParaRPr lang="en-US" sz="2800" dirty="0" smtClean="0"/>
           </a:p>
         </p:txBody>
       </p:sp>
@@ -10645,13 +10616,6 @@
               </a:rPr>
               <a:t>&lt;/body&gt;</a:t>
             </a:r>
-            <a:endParaRPr lang="en-US" dirty="0">
-              <a:solidFill>
-                <a:srgbClr val="000000"/>
-              </a:solidFill>
-              <a:latin typeface="Courier New"/>
-              <a:cs typeface="Courier New"/>
-            </a:endParaRPr>
           </a:p>
         </p:txBody>
       </p:sp>
@@ -10902,13 +10866,6 @@
               </a:rPr>
               <a:t>&lt;/body&gt;</a:t>
             </a:r>
-            <a:endParaRPr lang="en-US" dirty="0">
-              <a:solidFill>
-                <a:srgbClr val="000000"/>
-              </a:solidFill>
-              <a:latin typeface="Courier New"/>
-              <a:cs typeface="Courier New"/>
-            </a:endParaRPr>
           </a:p>
         </p:txBody>
       </p:sp>
@@ -11159,13 +11116,6 @@
               </a:rPr>
               <a:t>&lt;/body&gt;</a:t>
             </a:r>
-            <a:endParaRPr lang="en-US" dirty="0">
-              <a:solidFill>
-                <a:srgbClr val="000000"/>
-              </a:solidFill>
-              <a:latin typeface="Courier New"/>
-              <a:cs typeface="Courier New"/>
-            </a:endParaRPr>
           </a:p>
         </p:txBody>
       </p:sp>
@@ -11416,13 +11366,6 @@
               </a:rPr>
               <a:t>&lt;/body&gt;</a:t>
             </a:r>
-            <a:endParaRPr lang="en-US" dirty="0">
-              <a:solidFill>
-                <a:srgbClr val="000000"/>
-              </a:solidFill>
-              <a:latin typeface="Courier New"/>
-              <a:cs typeface="Courier New"/>
-            </a:endParaRPr>
           </a:p>
         </p:txBody>
       </p:sp>
@@ -11714,13 +11657,6 @@
               </a:rPr>
               <a:t>&lt;/body&gt;</a:t>
             </a:r>
-            <a:endParaRPr lang="en-US" dirty="0">
-              <a:solidFill>
-                <a:srgbClr val="000000"/>
-              </a:solidFill>
-              <a:latin typeface="Courier New"/>
-              <a:cs typeface="Courier New"/>
-            </a:endParaRPr>
           </a:p>
         </p:txBody>
       </p:sp>
@@ -11973,13 +11909,6 @@
               </a:rPr>
               <a:t>&lt;/body&gt;</a:t>
             </a:r>
-            <a:endParaRPr lang="en-US" dirty="0">
-              <a:solidFill>
-                <a:srgbClr val="000000"/>
-              </a:solidFill>
-              <a:latin typeface="Courier New"/>
-              <a:cs typeface="Courier New"/>
-            </a:endParaRPr>
           </a:p>
         </p:txBody>
       </p:sp>
@@ -12230,13 +12159,6 @@
               </a:rPr>
               <a:t>&lt;/body&gt;</a:t>
             </a:r>
-            <a:endParaRPr lang="en-US" dirty="0">
-              <a:solidFill>
-                <a:srgbClr val="000000"/>
-              </a:solidFill>
-              <a:latin typeface="Courier New"/>
-              <a:cs typeface="Courier New"/>
-            </a:endParaRPr>
           </a:p>
         </p:txBody>
       </p:sp>
@@ -12483,13 +12405,6 @@
               </a:rPr>
               <a:t>&lt;/body&gt;</a:t>
             </a:r>
-            <a:endParaRPr lang="en-US" sz="1400" dirty="0">
-              <a:solidFill>
-                <a:srgbClr val="000000"/>
-              </a:solidFill>
-              <a:latin typeface="Courier New"/>
-              <a:cs typeface="Courier New"/>
-            </a:endParaRPr>
           </a:p>
         </p:txBody>
       </p:sp>
@@ -14382,18 +14297,35 @@
           </a:p>
           <a:p>
             <a:r>
+              <a:rPr lang="en-US" dirty="0" smtClean="0"/>
+              <a:t>Lindsey – </a:t>
+            </a:r>
+            <a:r>
+              <a:rPr lang="en-US" dirty="0" smtClean="0">
+                <a:hlinkClick r:id="rId5"/>
+              </a:rPr>
+              <a:t>http://hyvee.com</a:t>
+            </a:r>
+            <a:r>
+              <a:rPr lang="en-US" smtClean="0"/>
+              <a:t> </a:t>
+            </a:r>
+            <a:endParaRPr lang="en-US" dirty="0" smtClean="0"/>
+          </a:p>
+          <a:p>
+            <a:r>
               <a:rPr lang="en-US" dirty="0"/>
               <a:t>Miles - </a:t>
             </a:r>
             <a:r>
               <a:rPr lang="en-US" dirty="0">
-                <a:hlinkClick r:id="rId5"/>
+                <a:hlinkClick r:id="rId6"/>
               </a:rPr>
               <a:t>http://thewildernessdowntown.com</a:t>
             </a:r>
             <a:r>
               <a:rPr lang="en-US" dirty="0" smtClean="0">
-                <a:hlinkClick r:id="rId5"/>
+                <a:hlinkClick r:id="rId6"/>
               </a:rPr>
               <a:t>/</a:t>
             </a:r>

</xml_diff>

<commit_message>
Last minute slide re-ordering.
</commit_message>
<xml_diff>
--- a/slides/classthree/slides.pptx
+++ b/slides/classthree/slides.pptx
@@ -5,7 +5,7 @@
     <p:sldMasterId id="2147483660" r:id="rId1"/>
   </p:sldMasterIdLst>
   <p:notesMasterIdLst>
-    <p:notesMasterId r:id="rId41"/>
+    <p:notesMasterId r:id="rId42"/>
   </p:notesMasterIdLst>
   <p:sldIdLst>
     <p:sldId id="256" r:id="rId2"/>
@@ -28,25 +28,26 @@
     <p:sldId id="313" r:id="rId19"/>
     <p:sldId id="327" r:id="rId20"/>
     <p:sldId id="328" r:id="rId21"/>
-    <p:sldId id="329" r:id="rId22"/>
-    <p:sldId id="330" r:id="rId23"/>
-    <p:sldId id="331" r:id="rId24"/>
-    <p:sldId id="332" r:id="rId25"/>
-    <p:sldId id="333" r:id="rId26"/>
-    <p:sldId id="334" r:id="rId27"/>
-    <p:sldId id="335" r:id="rId28"/>
-    <p:sldId id="336" r:id="rId29"/>
+    <p:sldId id="339" r:id="rId22"/>
+    <p:sldId id="329" r:id="rId23"/>
+    <p:sldId id="330" r:id="rId24"/>
+    <p:sldId id="331" r:id="rId25"/>
+    <p:sldId id="332" r:id="rId26"/>
+    <p:sldId id="333" r:id="rId27"/>
+    <p:sldId id="334" r:id="rId28"/>
+    <p:sldId id="335" r:id="rId29"/>
     <p:sldId id="315" r:id="rId30"/>
     <p:sldId id="337" r:id="rId31"/>
-    <p:sldId id="312" r:id="rId32"/>
-    <p:sldId id="268" r:id="rId33"/>
-    <p:sldId id="322" r:id="rId34"/>
-    <p:sldId id="323" r:id="rId35"/>
-    <p:sldId id="324" r:id="rId36"/>
-    <p:sldId id="325" r:id="rId37"/>
-    <p:sldId id="326" r:id="rId38"/>
-    <p:sldId id="270" r:id="rId39"/>
-    <p:sldId id="267" r:id="rId40"/>
+    <p:sldId id="340" r:id="rId32"/>
+    <p:sldId id="312" r:id="rId33"/>
+    <p:sldId id="268" r:id="rId34"/>
+    <p:sldId id="322" r:id="rId35"/>
+    <p:sldId id="323" r:id="rId36"/>
+    <p:sldId id="324" r:id="rId37"/>
+    <p:sldId id="325" r:id="rId38"/>
+    <p:sldId id="326" r:id="rId39"/>
+    <p:sldId id="270" r:id="rId40"/>
+    <p:sldId id="267" r:id="rId41"/>
   </p:sldIdLst>
   <p:sldSz cx="9144000" cy="6858000" type="screen4x3"/>
   <p:notesSz cx="6858000" cy="9144000"/>
@@ -896,7 +897,7 @@
           <a:p>
             <a:r>
               <a:rPr lang="en-US" dirty="0" smtClean="0"/>
-              <a:t>Break – 8 minutes</a:t>
+              <a:t>20 minutes</a:t>
             </a:r>
             <a:endParaRPr lang="en-US" dirty="0"/>
           </a:p>
@@ -928,7 +929,7 @@
     </p:spTree>
     <p:extLst>
       <p:ext uri="{BB962C8B-B14F-4D97-AF65-F5344CB8AC3E}">
-        <p14:creationId xmlns:p14="http://schemas.microsoft.com/office/powerpoint/2010/main" val="2491357436"/>
+        <p14:creationId xmlns:p14="http://schemas.microsoft.com/office/powerpoint/2010/main" val="156239481"/>
       </p:ext>
     </p:extLst>
   </p:cSld>
@@ -984,7 +985,7 @@
           <a:p>
             <a:r>
               <a:rPr lang="en-US" dirty="0" smtClean="0"/>
-              <a:t>35 minutes</a:t>
+              <a:t>Break – 8 minutes</a:t>
             </a:r>
             <a:endParaRPr lang="en-US" dirty="0"/>
           </a:p>
@@ -1016,7 +1017,7 @@
     </p:spTree>
     <p:extLst>
       <p:ext uri="{BB962C8B-B14F-4D97-AF65-F5344CB8AC3E}">
-        <p14:creationId xmlns:p14="http://schemas.microsoft.com/office/powerpoint/2010/main" val="1220344411"/>
+        <p14:creationId xmlns:p14="http://schemas.microsoft.com/office/powerpoint/2010/main" val="2491357436"/>
       </p:ext>
     </p:extLst>
   </p:cSld>
@@ -1072,7 +1073,7 @@
           <a:p>
             <a:r>
               <a:rPr lang="en-US" dirty="0" smtClean="0"/>
-              <a:t>20 minutes</a:t>
+              <a:t>35 minutes</a:t>
             </a:r>
             <a:endParaRPr lang="en-US" dirty="0"/>
           </a:p>
@@ -1095,7 +1096,7 @@
           <a:p>
             <a:fld id="{F0AB357A-3C6D-9E43-AB07-807CDFEA83A0}" type="slidenum">
               <a:rPr lang="en-US" smtClean="0"/>
-              <a:t>38</a:t>
+              <a:t>33</a:t>
             </a:fld>
             <a:endParaRPr lang="en-US"/>
           </a:p>
@@ -1104,7 +1105,7 @@
     </p:spTree>
     <p:extLst>
       <p:ext uri="{BB962C8B-B14F-4D97-AF65-F5344CB8AC3E}">
-        <p14:creationId xmlns:p14="http://schemas.microsoft.com/office/powerpoint/2010/main" val="156239481"/>
+        <p14:creationId xmlns:p14="http://schemas.microsoft.com/office/powerpoint/2010/main" val="1220344411"/>
       </p:ext>
     </p:extLst>
   </p:cSld>
@@ -1160,15 +1161,7 @@
           <a:p>
             <a:r>
               <a:rPr lang="en-US" dirty="0" smtClean="0"/>
-              <a:t>http://</a:t>
-            </a:r>
-            <a:r>
-              <a:rPr lang="en-US" dirty="0" err="1" smtClean="0"/>
-              <a:t>dl.dropbox.com</a:t>
-            </a:r>
-            <a:r>
-              <a:rPr lang="en-US" dirty="0" smtClean="0"/>
-              <a:t>/u/41609448/art329/assignments/index.html#schedule_class3</a:t>
+              <a:t>20 minutes</a:t>
             </a:r>
             <a:endParaRPr lang="en-US" dirty="0"/>
           </a:p>
@@ -1192,6 +1185,102 @@
             <a:fld id="{F0AB357A-3C6D-9E43-AB07-807CDFEA83A0}" type="slidenum">
               <a:rPr lang="en-US" smtClean="0"/>
               <a:t>39</a:t>
+            </a:fld>
+            <a:endParaRPr lang="en-US"/>
+          </a:p>
+        </p:txBody>
+      </p:sp>
+    </p:spTree>
+    <p:extLst>
+      <p:ext uri="{BB962C8B-B14F-4D97-AF65-F5344CB8AC3E}">
+        <p14:creationId xmlns:p14="http://schemas.microsoft.com/office/powerpoint/2010/main" val="156239481"/>
+      </p:ext>
+    </p:extLst>
+  </p:cSld>
+  <p:clrMapOvr>
+    <a:masterClrMapping/>
+  </p:clrMapOvr>
+</p:notes>
+</file>
+
+<file path=ppt/notesSlides/notesSlide17.xml><?xml version="1.0" encoding="utf-8"?>
+<p:notes xmlns:a="http://schemas.openxmlformats.org/drawingml/2006/main" xmlns:r="http://schemas.openxmlformats.org/officeDocument/2006/relationships" xmlns:p="http://schemas.openxmlformats.org/presentationml/2006/main">
+  <p:cSld>
+    <p:spTree>
+      <p:nvGrpSpPr>
+        <p:cNvPr id="1" name=""/>
+        <p:cNvGrpSpPr/>
+        <p:nvPr/>
+      </p:nvGrpSpPr>
+      <p:grpSpPr>
+        <a:xfrm>
+          <a:off x="0" y="0"/>
+          <a:ext cx="0" cy="0"/>
+          <a:chOff x="0" y="0"/>
+          <a:chExt cx="0" cy="0"/>
+        </a:xfrm>
+      </p:grpSpPr>
+      <p:sp>
+        <p:nvSpPr>
+          <p:cNvPr id="2" name="Slide Image Placeholder 1"/>
+          <p:cNvSpPr>
+            <a:spLocks noGrp="1" noRot="1" noChangeAspect="1"/>
+          </p:cNvSpPr>
+          <p:nvPr>
+            <p:ph type="sldImg"/>
+          </p:nvPr>
+        </p:nvSpPr>
+        <p:spPr/>
+      </p:sp>
+      <p:sp>
+        <p:nvSpPr>
+          <p:cNvPr id="3" name="Notes Placeholder 2"/>
+          <p:cNvSpPr>
+            <a:spLocks noGrp="1"/>
+          </p:cNvSpPr>
+          <p:nvPr>
+            <p:ph type="body" idx="1"/>
+          </p:nvPr>
+        </p:nvSpPr>
+        <p:spPr/>
+        <p:txBody>
+          <a:bodyPr/>
+          <a:lstStyle/>
+          <a:p>
+            <a:r>
+              <a:rPr lang="en-US" dirty="0" smtClean="0"/>
+              <a:t>http://</a:t>
+            </a:r>
+            <a:r>
+              <a:rPr lang="en-US" dirty="0" err="1" smtClean="0"/>
+              <a:t>dl.dropbox.com</a:t>
+            </a:r>
+            <a:r>
+              <a:rPr lang="en-US" dirty="0" smtClean="0"/>
+              <a:t>/u/41609448/art329/assignments/index.html#schedule_class3</a:t>
+            </a:r>
+            <a:endParaRPr lang="en-US" dirty="0"/>
+          </a:p>
+        </p:txBody>
+      </p:sp>
+      <p:sp>
+        <p:nvSpPr>
+          <p:cNvPr id="4" name="Slide Number Placeholder 3"/>
+          <p:cNvSpPr>
+            <a:spLocks noGrp="1"/>
+          </p:cNvSpPr>
+          <p:nvPr>
+            <p:ph type="sldNum" sz="quarter" idx="10"/>
+          </p:nvPr>
+        </p:nvSpPr>
+        <p:spPr/>
+        <p:txBody>
+          <a:bodyPr/>
+          <a:lstStyle/>
+          <a:p>
+            <a:fld id="{F0AB357A-3C6D-9E43-AB07-807CDFEA83A0}" type="slidenum">
+              <a:rPr lang="en-US" smtClean="0"/>
+              <a:t>40</a:t>
             </a:fld>
             <a:endParaRPr lang="en-US"/>
           </a:p>
@@ -7850,6 +7939,13 @@
   <p:clrMapOvr>
     <a:masterClrMapping/>
   </p:clrMapOvr>
+  <p:timing>
+    <p:tnLst>
+      <p:par>
+        <p:cTn xmlns:p14="http://schemas.microsoft.com/office/powerpoint/2010/main" id="1" dur="indefinite" restart="never" nodeType="tmRoot"/>
+      </p:par>
+    </p:tnLst>
+  </p:timing>
 </p:sld>
 </file>
 
@@ -8714,17 +8810,18 @@
           <a:p>
             <a:r>
               <a:rPr lang="en-US" dirty="0" smtClean="0"/>
-              <a:t>target – browser window</a:t>
-            </a:r>
-          </a:p>
-          <a:p>
-            <a:r>
-              <a:rPr lang="en-US" dirty="0" smtClean="0"/>
-              <a:t>title – </a:t>
-            </a:r>
-            <a:r>
-              <a:rPr lang="en-US" smtClean="0"/>
-              <a:t>popover text</a:t>
+              <a:t>target – browser </a:t>
+            </a:r>
+            <a:r>
+              <a:rPr lang="en-US" dirty="0" smtClean="0"/>
+              <a:t>window: _blank, _self, _parent</a:t>
+            </a:r>
+            <a:endParaRPr lang="en-US" dirty="0" smtClean="0"/>
+          </a:p>
+          <a:p>
+            <a:r>
+              <a:rPr lang="en-US" dirty="0" smtClean="0"/>
+              <a:t>title – popover text</a:t>
             </a:r>
           </a:p>
           <a:p>
@@ -10355,10 +10452,14 @@
           <a:lstStyle/>
           <a:p>
             <a:r>
-              <a:rPr lang="en-US" smtClean="0"/>
-              <a:t>http://www.w3.org/TR/CSS2/selector.html</a:t>
-            </a:r>
-            <a:endParaRPr lang="en-US"/>
+              <a:rPr lang="en-US" dirty="0" smtClean="0"/>
+              <a:t>http://www.w3.org/TR/CSS2/</a:t>
+            </a:r>
+            <a:r>
+              <a:rPr lang="en-US" dirty="0" err="1" smtClean="0"/>
+              <a:t>selector.html</a:t>
+            </a:r>
+            <a:endParaRPr lang="en-US" dirty="0"/>
           </a:p>
         </p:txBody>
       </p:sp>
@@ -10415,46 +10516,250 @@
           <a:lstStyle/>
           <a:p>
             <a:r>
-              <a:rPr lang="en-US" dirty="0"/>
+              <a:rPr lang="en-US" dirty="0" smtClean="0"/>
+              <a:t>Example</a:t>
+            </a:r>
+            <a:endParaRPr lang="en-US" dirty="0"/>
+          </a:p>
+        </p:txBody>
+      </p:sp>
+      <p:sp>
+        <p:nvSpPr>
+          <p:cNvPr id="3" name="Content Placeholder 2"/>
+          <p:cNvSpPr>
+            <a:spLocks noGrp="1"/>
+          </p:cNvSpPr>
+          <p:nvPr>
+            <p:ph sz="quarter" idx="13"/>
+          </p:nvPr>
+        </p:nvSpPr>
+        <p:spPr/>
+        <p:txBody>
+          <a:bodyPr>
+            <a:normAutofit/>
+          </a:bodyPr>
+          <a:lstStyle/>
+          <a:p>
+            <a:pPr marL="0" indent="0">
+              <a:buNone/>
+            </a:pPr>
+            <a:r>
+              <a:rPr lang="en-US" sz="1400" dirty="0">
+                <a:solidFill>
+                  <a:srgbClr val="000000"/>
+                </a:solidFill>
+                <a:latin typeface="Courier New"/>
+                <a:cs typeface="Courier New"/>
+              </a:rPr>
+              <a:t>&lt;body&gt;</a:t>
+            </a:r>
+          </a:p>
+          <a:p>
+            <a:pPr marL="0" indent="0">
+              <a:buNone/>
+            </a:pPr>
+            <a:r>
+              <a:rPr lang="en-US" sz="1400" dirty="0">
+                <a:solidFill>
+                  <a:srgbClr val="000000"/>
+                </a:solidFill>
+                <a:latin typeface="Courier New"/>
+                <a:cs typeface="Courier New"/>
+              </a:rPr>
+              <a:t>&lt;p&gt;Welcome to our site.&lt;/p&gt;</a:t>
+            </a:r>
+          </a:p>
+          <a:p>
+            <a:pPr marL="0" indent="0">
+              <a:buNone/>
+            </a:pPr>
+            <a:r>
+              <a:rPr lang="en-US" sz="1400" dirty="0">
+                <a:solidFill>
+                  <a:srgbClr val="000000"/>
+                </a:solidFill>
+                <a:latin typeface="Courier New"/>
+                <a:cs typeface="Courier New"/>
+              </a:rPr>
+              <a:t>&lt;div id="content"&gt;</a:t>
+            </a:r>
+          </a:p>
+          <a:p>
+            <a:pPr marL="0" indent="0">
+              <a:buNone/>
+            </a:pPr>
+            <a:r>
+              <a:rPr lang="en-US" sz="1400" dirty="0">
+                <a:solidFill>
+                  <a:srgbClr val="000000"/>
+                </a:solidFill>
+                <a:latin typeface="Courier New"/>
+                <a:cs typeface="Courier New"/>
+              </a:rPr>
+              <a:t>	&lt;p&gt;&lt;a </a:t>
+            </a:r>
+            <a:r>
+              <a:rPr lang="en-US" sz="1400" dirty="0" err="1">
+                <a:solidFill>
+                  <a:srgbClr val="000000"/>
+                </a:solidFill>
+                <a:latin typeface="Courier New"/>
+                <a:cs typeface="Courier New"/>
+              </a:rPr>
+              <a:t>href</a:t>
+            </a:r>
+            <a:r>
+              <a:rPr lang="en-US" sz="1400" dirty="0">
+                <a:solidFill>
+                  <a:srgbClr val="000000"/>
+                </a:solidFill>
+                <a:latin typeface="Courier New"/>
+                <a:cs typeface="Courier New"/>
+              </a:rPr>
+              <a:t>="http://</a:t>
+            </a:r>
+            <a:r>
+              <a:rPr lang="en-US" sz="1400" dirty="0" err="1">
+                <a:solidFill>
+                  <a:srgbClr val="000000"/>
+                </a:solidFill>
+                <a:latin typeface="Courier New"/>
+                <a:cs typeface="Courier New"/>
+              </a:rPr>
+              <a:t>google.com</a:t>
+            </a:r>
+            <a:r>
+              <a:rPr lang="en-US" sz="1400" dirty="0">
+                <a:solidFill>
+                  <a:srgbClr val="000000"/>
+                </a:solidFill>
+                <a:latin typeface="Courier New"/>
+                <a:cs typeface="Courier New"/>
+              </a:rPr>
+              <a:t>"&gt;Visit Google&lt;/a&gt; if you want a search engine.&lt;/p&gt;</a:t>
+            </a:r>
+          </a:p>
+          <a:p>
+            <a:pPr marL="0" indent="0">
+              <a:buNone/>
+            </a:pPr>
+            <a:r>
+              <a:rPr lang="en-US" sz="1400" dirty="0">
+                <a:solidFill>
+                  <a:srgbClr val="000000"/>
+                </a:solidFill>
+                <a:latin typeface="Courier New"/>
+                <a:cs typeface="Courier New"/>
+              </a:rPr>
+              <a:t>	&lt;span class="message"&gt;</a:t>
+            </a:r>
+          </a:p>
+          <a:p>
+            <a:pPr marL="0" indent="0">
+              <a:buNone/>
+            </a:pPr>
+            <a:r>
+              <a:rPr lang="en-US" sz="1400" dirty="0">
+                <a:solidFill>
+                  <a:srgbClr val="000000"/>
+                </a:solidFill>
+                <a:latin typeface="Courier New"/>
+                <a:cs typeface="Courier New"/>
+              </a:rPr>
+              <a:t>		&lt;p&gt;For more details, keep reading.&lt;/p&gt;</a:t>
+            </a:r>
+          </a:p>
+          <a:p>
+            <a:pPr marL="0" indent="0">
+              <a:buNone/>
+            </a:pPr>
+            <a:r>
+              <a:rPr lang="en-US" sz="1400" dirty="0">
+                <a:solidFill>
+                  <a:srgbClr val="000000"/>
+                </a:solidFill>
+                <a:latin typeface="Courier New"/>
+                <a:cs typeface="Courier New"/>
+              </a:rPr>
+              <a:t>	&lt;/span&gt;</a:t>
+            </a:r>
+          </a:p>
+          <a:p>
+            <a:pPr marL="0" indent="0">
+              <a:buNone/>
+            </a:pPr>
+            <a:r>
+              <a:rPr lang="en-US" sz="1400" dirty="0">
+                <a:solidFill>
+                  <a:srgbClr val="000000"/>
+                </a:solidFill>
+                <a:latin typeface="Courier New"/>
+                <a:cs typeface="Courier New"/>
+              </a:rPr>
+              <a:t>&lt;/div&gt;</a:t>
+            </a:r>
+          </a:p>
+          <a:p>
+            <a:pPr marL="0" indent="0">
+              <a:buNone/>
+            </a:pPr>
+            <a:r>
+              <a:rPr lang="en-US" sz="1400" dirty="0">
+                <a:solidFill>
+                  <a:srgbClr val="000000"/>
+                </a:solidFill>
+                <a:latin typeface="Courier New"/>
+                <a:cs typeface="Courier New"/>
+              </a:rPr>
+              <a:t>&lt;/body&gt;</a:t>
+            </a:r>
+          </a:p>
+        </p:txBody>
+      </p:sp>
+      <p:sp>
+        <p:nvSpPr>
+          <p:cNvPr id="4" name="Content Placeholder 3"/>
+          <p:cNvSpPr>
+            <a:spLocks noGrp="1"/>
+          </p:cNvSpPr>
+          <p:nvPr>
+            <p:ph sz="quarter" idx="14"/>
+          </p:nvPr>
+        </p:nvSpPr>
+        <p:spPr/>
+        <p:txBody>
+          <a:bodyPr>
+            <a:noAutofit/>
+          </a:bodyPr>
+          <a:lstStyle/>
+          <a:p>
+            <a:pPr marL="0" indent="0">
+              <a:buNone/>
+            </a:pPr>
+            <a:r>
+              <a:rPr lang="en-US" sz="1400" dirty="0">
+                <a:solidFill>
+                  <a:srgbClr val="000000"/>
+                </a:solidFill>
+                <a:latin typeface="Courier New"/>
+                <a:cs typeface="Courier New"/>
+              </a:rPr>
               <a:t>* { margin: 0; padding: 0; }</a:t>
             </a:r>
           </a:p>
-        </p:txBody>
-      </p:sp>
-      <p:sp>
-        <p:nvSpPr>
-          <p:cNvPr id="3" name="Content Placeholder 2"/>
-          <p:cNvSpPr>
-            <a:spLocks noGrp="1"/>
-          </p:cNvSpPr>
-          <p:nvPr>
-            <p:ph idx="1"/>
-          </p:nvPr>
-        </p:nvSpPr>
-        <p:spPr>
-          <a:xfrm>
-            <a:off x="1062217" y="2119257"/>
-            <a:ext cx="6998052" cy="3603812"/>
-          </a:xfrm>
-        </p:spPr>
-        <p:txBody>
-          <a:bodyPr>
-            <a:normAutofit fontScale="85000" lnSpcReduction="10000"/>
-          </a:bodyPr>
-          <a:lstStyle/>
           <a:p>
             <a:pPr marL="0" indent="0">
               <a:buNone/>
             </a:pPr>
             <a:r>
-              <a:rPr lang="en-US" dirty="0">
+              <a:rPr lang="en-US" sz="1400" dirty="0">
                 <a:solidFill>
                   <a:srgbClr val="000000"/>
                 </a:solidFill>
                 <a:latin typeface="Courier New"/>
                 <a:cs typeface="Courier New"/>
               </a:rPr>
-              <a:t>&lt;body&gt;</a:t>
+              <a:t>p { padding-bottom: 10px; }</a:t>
             </a:r>
           </a:p>
           <a:p>
@@ -10462,14 +10767,14 @@
               <a:buNone/>
             </a:pPr>
             <a:r>
-              <a:rPr lang="en-US" dirty="0">
+              <a:rPr lang="en-US" sz="1400" dirty="0">
                 <a:solidFill>
                   <a:srgbClr val="000000"/>
                 </a:solidFill>
                 <a:latin typeface="Courier New"/>
                 <a:cs typeface="Courier New"/>
               </a:rPr>
-              <a:t>&lt;p&gt;Welcome to our site.&lt;/p&gt;</a:t>
+              <a:t>div p { color: green; }</a:t>
             </a:r>
           </a:p>
           <a:p>
@@ -10477,14 +10782,14 @@
               <a:buNone/>
             </a:pPr>
             <a:r>
-              <a:rPr lang="en-US" dirty="0">
+              <a:rPr lang="en-US" sz="1400" dirty="0">
                 <a:solidFill>
                   <a:srgbClr val="000000"/>
                 </a:solidFill>
                 <a:latin typeface="Courier New"/>
                 <a:cs typeface="Courier New"/>
               </a:rPr>
-              <a:t>&lt;div id="content"&gt;</a:t>
+              <a:t>div &gt; p { color: blue; }</a:t>
             </a:r>
           </a:p>
           <a:p>
@@ -10492,54 +10797,104 @@
               <a:buNone/>
             </a:pPr>
             <a:r>
-              <a:rPr lang="en-US" dirty="0">
+              <a:rPr lang="en-US" sz="1400" dirty="0" err="1">
                 <a:solidFill>
                   <a:srgbClr val="000000"/>
                 </a:solidFill>
                 <a:latin typeface="Courier New"/>
                 <a:cs typeface="Courier New"/>
               </a:rPr>
-              <a:t>	&lt;p&gt;&lt;a </a:t>
-            </a:r>
-            <a:r>
-              <a:rPr lang="en-US" dirty="0" err="1">
+              <a:t>a:link</a:t>
+            </a:r>
+            <a:r>
+              <a:rPr lang="en-US" sz="1400" dirty="0">
                 <a:solidFill>
                   <a:srgbClr val="000000"/>
                 </a:solidFill>
                 <a:latin typeface="Courier New"/>
                 <a:cs typeface="Courier New"/>
               </a:rPr>
-              <a:t>href</a:t>
-            </a:r>
-            <a:r>
-              <a:rPr lang="en-US" dirty="0">
+              <a:t>, </a:t>
+            </a:r>
+            <a:r>
+              <a:rPr lang="en-US" sz="1400" dirty="0" err="1">
                 <a:solidFill>
                   <a:srgbClr val="000000"/>
                 </a:solidFill>
                 <a:latin typeface="Courier New"/>
                 <a:cs typeface="Courier New"/>
               </a:rPr>
-              <a:t>="http://</a:t>
-            </a:r>
-            <a:r>
-              <a:rPr lang="en-US" dirty="0" err="1">
+              <a:t>a:visited</a:t>
+            </a:r>
+            <a:r>
+              <a:rPr lang="en-US" sz="1400" dirty="0">
                 <a:solidFill>
                   <a:srgbClr val="000000"/>
                 </a:solidFill>
                 <a:latin typeface="Courier New"/>
                 <a:cs typeface="Courier New"/>
               </a:rPr>
-              <a:t>google.com</a:t>
-            </a:r>
-            <a:r>
-              <a:rPr lang="en-US" dirty="0">
+              <a:t>, </a:t>
+            </a:r>
+            <a:r>
+              <a:rPr lang="en-US" sz="1400" dirty="0" err="1">
                 <a:solidFill>
                   <a:srgbClr val="000000"/>
                 </a:solidFill>
                 <a:latin typeface="Courier New"/>
                 <a:cs typeface="Courier New"/>
               </a:rPr>
-              <a:t>"&gt;Visit Google&lt;/a&gt; if you want a search engine.&lt;/p&gt;</a:t>
+              <a:t>a:active</a:t>
+            </a:r>
+            <a:r>
+              <a:rPr lang="en-US" sz="1400" dirty="0">
+                <a:solidFill>
+                  <a:srgbClr val="000000"/>
+                </a:solidFill>
+                <a:latin typeface="Courier New"/>
+                <a:cs typeface="Courier New"/>
+              </a:rPr>
+              <a:t>, </a:t>
+            </a:r>
+            <a:r>
+              <a:rPr lang="en-US" sz="1400" dirty="0" err="1">
+                <a:solidFill>
+                  <a:srgbClr val="000000"/>
+                </a:solidFill>
+                <a:latin typeface="Courier New"/>
+                <a:cs typeface="Courier New"/>
+              </a:rPr>
+              <a:t>a:hover</a:t>
+            </a:r>
+            <a:r>
+              <a:rPr lang="en-US" sz="1400" dirty="0">
+                <a:solidFill>
+                  <a:srgbClr val="000000"/>
+                </a:solidFill>
+                <a:latin typeface="Courier New"/>
+                <a:cs typeface="Courier New"/>
+              </a:rPr>
+              <a:t>, </a:t>
+            </a:r>
+            <a:r>
+              <a:rPr lang="en-US" sz="1400" dirty="0" err="1">
+                <a:solidFill>
+                  <a:srgbClr val="000000"/>
+                </a:solidFill>
+                <a:latin typeface="Courier New"/>
+                <a:cs typeface="Courier New"/>
+              </a:rPr>
+              <a:t>a:focus</a:t>
+            </a:r>
+            <a:r>
+              <a:rPr lang="en-US" sz="1400" dirty="0">
+                <a:solidFill>
+                  <a:srgbClr val="000000"/>
+                </a:solidFill>
+                <a:latin typeface="Courier New"/>
+                <a:cs typeface="Courier New"/>
+              </a:rPr>
+              <a:t> { color: black; }</a:t>
             </a:r>
           </a:p>
           <a:p>
@@ -10547,14 +10902,14 @@
               <a:buNone/>
             </a:pPr>
             <a:r>
-              <a:rPr lang="en-US" dirty="0">
+              <a:rPr lang="en-US" sz="1400" dirty="0">
                 <a:solidFill>
                   <a:srgbClr val="000000"/>
                 </a:solidFill>
                 <a:latin typeface="Courier New"/>
                 <a:cs typeface="Courier New"/>
               </a:rPr>
-              <a:t>	&lt;span class="message"&gt;</a:t>
+              <a:t>.message { background: red; }</a:t>
             </a:r>
           </a:p>
           <a:p>
@@ -10562,59 +10917,14 @@
               <a:buNone/>
             </a:pPr>
             <a:r>
-              <a:rPr lang="en-US" dirty="0">
+              <a:rPr lang="en-US" sz="1400" dirty="0">
                 <a:solidFill>
                   <a:srgbClr val="000000"/>
                 </a:solidFill>
                 <a:latin typeface="Courier New"/>
                 <a:cs typeface="Courier New"/>
               </a:rPr>
-              <a:t>		&lt;p&gt;For more details, keep reading.&lt;/p&gt;</a:t>
-            </a:r>
-          </a:p>
-          <a:p>
-            <a:pPr marL="0" indent="0">
-              <a:buNone/>
-            </a:pPr>
-            <a:r>
-              <a:rPr lang="en-US" dirty="0">
-                <a:solidFill>
-                  <a:srgbClr val="000000"/>
-                </a:solidFill>
-                <a:latin typeface="Courier New"/>
-                <a:cs typeface="Courier New"/>
-              </a:rPr>
-              <a:t>	&lt;/span&gt;</a:t>
-            </a:r>
-          </a:p>
-          <a:p>
-            <a:pPr marL="0" indent="0">
-              <a:buNone/>
-            </a:pPr>
-            <a:r>
-              <a:rPr lang="en-US" dirty="0">
-                <a:solidFill>
-                  <a:srgbClr val="000000"/>
-                </a:solidFill>
-                <a:latin typeface="Courier New"/>
-                <a:cs typeface="Courier New"/>
-              </a:rPr>
-              <a:t>&lt;/div&gt;</a:t>
-            </a:r>
-          </a:p>
-          <a:p>
-            <a:pPr marL="0" indent="0">
-              <a:buNone/>
-            </a:pPr>
-            <a:r>
-              <a:rPr lang="en-US" dirty="0">
-                <a:solidFill>
-                  <a:srgbClr val="000000"/>
-                </a:solidFill>
-                <a:latin typeface="Courier New"/>
-                <a:cs typeface="Courier New"/>
-              </a:rPr>
-              <a:t>&lt;/body&gt;</a:t>
+              <a:t>#content { width: 200px; }</a:t>
             </a:r>
           </a:p>
         </p:txBody>
@@ -10622,13 +10932,20 @@
     </p:spTree>
     <p:extLst>
       <p:ext uri="{BB962C8B-B14F-4D97-AF65-F5344CB8AC3E}">
-        <p14:creationId xmlns:p14="http://schemas.microsoft.com/office/powerpoint/2010/main" val="775764395"/>
+        <p14:creationId xmlns:p14="http://schemas.microsoft.com/office/powerpoint/2010/main" val="2141280921"/>
       </p:ext>
     </p:extLst>
   </p:cSld>
   <p:clrMapOvr>
     <a:masterClrMapping/>
   </p:clrMapOvr>
+  <p:timing>
+    <p:tnLst>
+      <p:par>
+        <p:cTn xmlns:p14="http://schemas.microsoft.com/office/powerpoint/2010/main" id="1" dur="indefinite" restart="never" nodeType="tmRoot"/>
+      </p:par>
+    </p:tnLst>
+  </p:timing>
 </p:sld>
 </file>
 
@@ -10666,7 +10983,7 @@
           <a:p>
             <a:r>
               <a:rPr lang="en-US" dirty="0"/>
-              <a:t>p { padding-bottom: 10px; }</a:t>
+              <a:t>* { margin: 0; padding: 0; }</a:t>
             </a:r>
           </a:p>
         </p:txBody>
@@ -10697,7 +11014,7 @@
               <a:buNone/>
             </a:pPr>
             <a:r>
-              <a:rPr lang="en-US" dirty="0">
+              <a:rPr lang="en-US" b="1" dirty="0">
                 <a:solidFill>
                   <a:srgbClr val="000000"/>
                 </a:solidFill>
@@ -10712,7 +11029,7 @@
               <a:buNone/>
             </a:pPr>
             <a:r>
-              <a:rPr lang="en-US" dirty="0">
+              <a:rPr lang="en-US" b="1" dirty="0">
                 <a:solidFill>
                   <a:srgbClr val="000000"/>
                 </a:solidFill>
@@ -10727,7 +11044,7 @@
               <a:buNone/>
             </a:pPr>
             <a:r>
-              <a:rPr lang="en-US" dirty="0">
+              <a:rPr lang="en-US" b="1" dirty="0">
                 <a:solidFill>
                   <a:srgbClr val="000000"/>
                 </a:solidFill>
@@ -10742,7 +11059,7 @@
               <a:buNone/>
             </a:pPr>
             <a:r>
-              <a:rPr lang="en-US" dirty="0">
+              <a:rPr lang="en-US" b="1" dirty="0">
                 <a:solidFill>
                   <a:srgbClr val="000000"/>
                 </a:solidFill>
@@ -10752,7 +11069,7 @@
               <a:t>	&lt;p&gt;&lt;a </a:t>
             </a:r>
             <a:r>
-              <a:rPr lang="en-US" dirty="0" err="1">
+              <a:rPr lang="en-US" b="1" dirty="0" err="1">
                 <a:solidFill>
                   <a:srgbClr val="000000"/>
                 </a:solidFill>
@@ -10762,7 +11079,7 @@
               <a:t>href</a:t>
             </a:r>
             <a:r>
-              <a:rPr lang="en-US" dirty="0">
+              <a:rPr lang="en-US" b="1" dirty="0">
                 <a:solidFill>
                   <a:srgbClr val="000000"/>
                 </a:solidFill>
@@ -10772,7 +11089,7 @@
               <a:t>="http://</a:t>
             </a:r>
             <a:r>
-              <a:rPr lang="en-US" dirty="0" err="1">
+              <a:rPr lang="en-US" b="1" dirty="0" err="1">
                 <a:solidFill>
                   <a:srgbClr val="000000"/>
                 </a:solidFill>
@@ -10782,7 +11099,7 @@
               <a:t>google.com</a:t>
             </a:r>
             <a:r>
-              <a:rPr lang="en-US" dirty="0">
+              <a:rPr lang="en-US" b="1" dirty="0">
                 <a:solidFill>
                   <a:srgbClr val="000000"/>
                 </a:solidFill>
@@ -10797,7 +11114,7 @@
               <a:buNone/>
             </a:pPr>
             <a:r>
-              <a:rPr lang="en-US" dirty="0">
+              <a:rPr lang="en-US" b="1" dirty="0">
                 <a:solidFill>
                   <a:srgbClr val="000000"/>
                 </a:solidFill>
@@ -10812,7 +11129,7 @@
               <a:buNone/>
             </a:pPr>
             <a:r>
-              <a:rPr lang="en-US" dirty="0">
+              <a:rPr lang="en-US" b="1" dirty="0">
                 <a:solidFill>
                   <a:srgbClr val="000000"/>
                 </a:solidFill>
@@ -10827,7 +11144,7 @@
               <a:buNone/>
             </a:pPr>
             <a:r>
-              <a:rPr lang="en-US" dirty="0">
+              <a:rPr lang="en-US" b="1" dirty="0">
                 <a:solidFill>
                   <a:srgbClr val="000000"/>
                 </a:solidFill>
@@ -10842,7 +11159,7 @@
               <a:buNone/>
             </a:pPr>
             <a:r>
-              <a:rPr lang="en-US" dirty="0">
+              <a:rPr lang="en-US" b="1" dirty="0">
                 <a:solidFill>
                   <a:srgbClr val="000000"/>
                 </a:solidFill>
@@ -10857,7 +11174,7 @@
               <a:buNone/>
             </a:pPr>
             <a:r>
-              <a:rPr lang="en-US" dirty="0">
+              <a:rPr lang="en-US" b="1" dirty="0">
                 <a:solidFill>
                   <a:srgbClr val="000000"/>
                 </a:solidFill>
@@ -10872,13 +11189,20 @@
     </p:spTree>
     <p:extLst>
       <p:ext uri="{BB962C8B-B14F-4D97-AF65-F5344CB8AC3E}">
-        <p14:creationId xmlns:p14="http://schemas.microsoft.com/office/powerpoint/2010/main" val="2114841051"/>
+        <p14:creationId xmlns:p14="http://schemas.microsoft.com/office/powerpoint/2010/main" val="775764395"/>
       </p:ext>
     </p:extLst>
   </p:cSld>
   <p:clrMapOvr>
     <a:masterClrMapping/>
   </p:clrMapOvr>
+  <p:timing>
+    <p:tnLst>
+      <p:par>
+        <p:cTn xmlns:p14="http://schemas.microsoft.com/office/powerpoint/2010/main" id="1" dur="indefinite" restart="never" nodeType="tmRoot"/>
+      </p:par>
+    </p:tnLst>
+  </p:timing>
 </p:sld>
 </file>
 
@@ -10916,7 +11240,7 @@
           <a:p>
             <a:r>
               <a:rPr lang="en-US" dirty="0"/>
-              <a:t>div p { color: green; }</a:t>
+              <a:t>p { padding-bottom: 10px; }</a:t>
             </a:r>
           </a:p>
         </p:txBody>
@@ -10962,6 +11286,21 @@
               <a:buNone/>
             </a:pPr>
             <a:r>
+              <a:rPr lang="en-US" b="1" dirty="0">
+                <a:solidFill>
+                  <a:srgbClr val="000000"/>
+                </a:solidFill>
+                <a:latin typeface="Courier New"/>
+                <a:cs typeface="Courier New"/>
+              </a:rPr>
+              <a:t>&lt;p&gt;Welcome to our site.&lt;/p&gt;</a:t>
+            </a:r>
+          </a:p>
+          <a:p>
+            <a:pPr marL="0" indent="0">
+              <a:buNone/>
+            </a:pPr>
+            <a:r>
               <a:rPr lang="en-US" dirty="0">
                 <a:solidFill>
                   <a:srgbClr val="000000"/>
@@ -10969,7 +11308,7 @@
                 <a:latin typeface="Courier New"/>
                 <a:cs typeface="Courier New"/>
               </a:rPr>
-              <a:t>&lt;p&gt;Welcome to our site.&lt;/p&gt;</a:t>
+              <a:t>&lt;div id="content"&gt;</a:t>
             </a:r>
           </a:p>
           <a:p>
@@ -10984,7 +11323,57 @@
                 <a:latin typeface="Courier New"/>
                 <a:cs typeface="Courier New"/>
               </a:rPr>
-              <a:t>&lt;div id="content"&gt;</a:t>
+              <a:t>	</a:t>
+            </a:r>
+            <a:r>
+              <a:rPr lang="en-US" b="1" dirty="0">
+                <a:solidFill>
+                  <a:srgbClr val="000000"/>
+                </a:solidFill>
+                <a:latin typeface="Courier New"/>
+                <a:cs typeface="Courier New"/>
+              </a:rPr>
+              <a:t>&lt;p&gt;&lt;a </a:t>
+            </a:r>
+            <a:r>
+              <a:rPr lang="en-US" b="1" dirty="0" err="1">
+                <a:solidFill>
+                  <a:srgbClr val="000000"/>
+                </a:solidFill>
+                <a:latin typeface="Courier New"/>
+                <a:cs typeface="Courier New"/>
+              </a:rPr>
+              <a:t>href</a:t>
+            </a:r>
+            <a:r>
+              <a:rPr lang="en-US" b="1" dirty="0">
+                <a:solidFill>
+                  <a:srgbClr val="000000"/>
+                </a:solidFill>
+                <a:latin typeface="Courier New"/>
+                <a:cs typeface="Courier New"/>
+              </a:rPr>
+              <a:t>="http://</a:t>
+            </a:r>
+            <a:r>
+              <a:rPr lang="en-US" b="1" dirty="0" err="1">
+                <a:solidFill>
+                  <a:srgbClr val="000000"/>
+                </a:solidFill>
+                <a:latin typeface="Courier New"/>
+                <a:cs typeface="Courier New"/>
+              </a:rPr>
+              <a:t>google.com</a:t>
+            </a:r>
+            <a:r>
+              <a:rPr lang="en-US" b="1" dirty="0">
+                <a:solidFill>
+                  <a:srgbClr val="000000"/>
+                </a:solidFill>
+                <a:latin typeface="Courier New"/>
+                <a:cs typeface="Courier New"/>
+              </a:rPr>
+              <a:t>"&gt;Visit Google&lt;/a&gt; if you want a search engine.&lt;/p&gt;</a:t>
             </a:r>
           </a:p>
           <a:p>
@@ -10999,77 +11388,32 @@
                 <a:latin typeface="Courier New"/>
                 <a:cs typeface="Courier New"/>
               </a:rPr>
-              <a:t>	&lt;p&gt;&lt;a </a:t>
-            </a:r>
-            <a:r>
-              <a:rPr lang="en-US" dirty="0" err="1">
+              <a:t>	&lt;span class="message"&gt;</a:t>
+            </a:r>
+          </a:p>
+          <a:p>
+            <a:pPr marL="0" indent="0">
+              <a:buNone/>
+            </a:pPr>
+            <a:r>
+              <a:rPr lang="en-US" dirty="0">
                 <a:solidFill>
                   <a:srgbClr val="000000"/>
                 </a:solidFill>
                 <a:latin typeface="Courier New"/>
                 <a:cs typeface="Courier New"/>
               </a:rPr>
-              <a:t>href</a:t>
-            </a:r>
-            <a:r>
-              <a:rPr lang="en-US" dirty="0">
+              <a:t>		</a:t>
+            </a:r>
+            <a:r>
+              <a:rPr lang="en-US" b="1" dirty="0">
                 <a:solidFill>
                   <a:srgbClr val="000000"/>
                 </a:solidFill>
                 <a:latin typeface="Courier New"/>
                 <a:cs typeface="Courier New"/>
               </a:rPr>
-              <a:t>="http://</a:t>
-            </a:r>
-            <a:r>
-              <a:rPr lang="en-US" dirty="0" err="1">
-                <a:solidFill>
-                  <a:srgbClr val="000000"/>
-                </a:solidFill>
-                <a:latin typeface="Courier New"/>
-                <a:cs typeface="Courier New"/>
-              </a:rPr>
-              <a:t>google.com</a:t>
-            </a:r>
-            <a:r>
-              <a:rPr lang="en-US" dirty="0">
-                <a:solidFill>
-                  <a:srgbClr val="000000"/>
-                </a:solidFill>
-                <a:latin typeface="Courier New"/>
-                <a:cs typeface="Courier New"/>
-              </a:rPr>
-              <a:t>"&gt;Visit Google&lt;/a&gt; if you want a search engine.&lt;/p&gt;</a:t>
-            </a:r>
-          </a:p>
-          <a:p>
-            <a:pPr marL="0" indent="0">
-              <a:buNone/>
-            </a:pPr>
-            <a:r>
-              <a:rPr lang="en-US" dirty="0">
-                <a:solidFill>
-                  <a:srgbClr val="000000"/>
-                </a:solidFill>
-                <a:latin typeface="Courier New"/>
-                <a:cs typeface="Courier New"/>
-              </a:rPr>
-              <a:t>	&lt;span class="message"&gt;</a:t>
-            </a:r>
-          </a:p>
-          <a:p>
-            <a:pPr marL="0" indent="0">
-              <a:buNone/>
-            </a:pPr>
-            <a:r>
-              <a:rPr lang="en-US" dirty="0">
-                <a:solidFill>
-                  <a:srgbClr val="000000"/>
-                </a:solidFill>
-                <a:latin typeface="Courier New"/>
-                <a:cs typeface="Courier New"/>
-              </a:rPr>
-              <a:t>		&lt;p&gt;For more details, keep reading.&lt;/p&gt;</a:t>
+              <a:t>&lt;p&gt;For more details, keep reading.&lt;/p&gt;</a:t>
             </a:r>
           </a:p>
           <a:p>
@@ -11129,6 +11473,13 @@
   <p:clrMapOvr>
     <a:masterClrMapping/>
   </p:clrMapOvr>
+  <p:timing>
+    <p:tnLst>
+      <p:par>
+        <p:cTn xmlns:p14="http://schemas.microsoft.com/office/powerpoint/2010/main" id="1" dur="indefinite" restart="never" nodeType="tmRoot"/>
+      </p:par>
+    </p:tnLst>
+  </p:timing>
 </p:sld>
 </file>
 
@@ -11166,7 +11517,7 @@
           <a:p>
             <a:r>
               <a:rPr lang="en-US" dirty="0"/>
-              <a:t>div &gt; p { color: blue; }</a:t>
+              <a:t>div p { color: green; }</a:t>
             </a:r>
           </a:p>
         </p:txBody>
@@ -11249,19 +11600,64 @@
                 <a:latin typeface="Courier New"/>
                 <a:cs typeface="Courier New"/>
               </a:rPr>
-              <a:t>	&lt;p&gt;&lt;a </a:t>
-            </a:r>
-            <a:r>
-              <a:rPr lang="en-US" dirty="0" err="1">
+              <a:t>	</a:t>
+            </a:r>
+            <a:r>
+              <a:rPr lang="en-US" b="1" dirty="0">
                 <a:solidFill>
                   <a:srgbClr val="000000"/>
                 </a:solidFill>
                 <a:latin typeface="Courier New"/>
                 <a:cs typeface="Courier New"/>
               </a:rPr>
+              <a:t>&lt;p&gt;&lt;a </a:t>
+            </a:r>
+            <a:r>
+              <a:rPr lang="en-US" b="1" dirty="0" err="1">
+                <a:solidFill>
+                  <a:srgbClr val="000000"/>
+                </a:solidFill>
+                <a:latin typeface="Courier New"/>
+                <a:cs typeface="Courier New"/>
+              </a:rPr>
               <a:t>href</a:t>
             </a:r>
             <a:r>
+              <a:rPr lang="en-US" b="1" dirty="0">
+                <a:solidFill>
+                  <a:srgbClr val="000000"/>
+                </a:solidFill>
+                <a:latin typeface="Courier New"/>
+                <a:cs typeface="Courier New"/>
+              </a:rPr>
+              <a:t>="http://</a:t>
+            </a:r>
+            <a:r>
+              <a:rPr lang="en-US" b="1" dirty="0" err="1">
+                <a:solidFill>
+                  <a:srgbClr val="000000"/>
+                </a:solidFill>
+                <a:latin typeface="Courier New"/>
+                <a:cs typeface="Courier New"/>
+              </a:rPr>
+              <a:t>google.com</a:t>
+            </a:r>
+            <a:r>
+              <a:rPr lang="en-US" b="1" dirty="0">
+                <a:solidFill>
+                  <a:srgbClr val="000000"/>
+                </a:solidFill>
+                <a:latin typeface="Courier New"/>
+                <a:cs typeface="Courier New"/>
+              </a:rPr>
+              <a:t>"&gt;Visit Google&lt;/a&gt; if you want a search engine.&lt;/p&gt;</a:t>
+            </a:r>
+          </a:p>
+          <a:p>
+            <a:pPr marL="0" indent="0">
+              <a:buNone/>
+            </a:pPr>
+            <a:r>
               <a:rPr lang="en-US" dirty="0">
                 <a:solidFill>
                   <a:srgbClr val="000000"/>
@@ -11269,57 +11665,32 @@
                 <a:latin typeface="Courier New"/>
                 <a:cs typeface="Courier New"/>
               </a:rPr>
-              <a:t>="http://</a:t>
-            </a:r>
-            <a:r>
-              <a:rPr lang="en-US" dirty="0" err="1">
+              <a:t>	&lt;span class="message"&gt;</a:t>
+            </a:r>
+          </a:p>
+          <a:p>
+            <a:pPr marL="0" indent="0">
+              <a:buNone/>
+            </a:pPr>
+            <a:r>
+              <a:rPr lang="en-US" dirty="0">
                 <a:solidFill>
                   <a:srgbClr val="000000"/>
                 </a:solidFill>
                 <a:latin typeface="Courier New"/>
                 <a:cs typeface="Courier New"/>
               </a:rPr>
-              <a:t>google.com</a:t>
-            </a:r>
-            <a:r>
-              <a:rPr lang="en-US" dirty="0">
+              <a:t>		</a:t>
+            </a:r>
+            <a:r>
+              <a:rPr lang="en-US" b="1" dirty="0">
                 <a:solidFill>
                   <a:srgbClr val="000000"/>
                 </a:solidFill>
                 <a:latin typeface="Courier New"/>
                 <a:cs typeface="Courier New"/>
               </a:rPr>
-              <a:t>"&gt;Visit Google&lt;/a&gt; if you want a search engine.&lt;/p&gt;</a:t>
-            </a:r>
-          </a:p>
-          <a:p>
-            <a:pPr marL="0" indent="0">
-              <a:buNone/>
-            </a:pPr>
-            <a:r>
-              <a:rPr lang="en-US" dirty="0">
-                <a:solidFill>
-                  <a:srgbClr val="000000"/>
-                </a:solidFill>
-                <a:latin typeface="Courier New"/>
-                <a:cs typeface="Courier New"/>
-              </a:rPr>
-              <a:t>	&lt;span class="message"&gt;</a:t>
-            </a:r>
-          </a:p>
-          <a:p>
-            <a:pPr marL="0" indent="0">
-              <a:buNone/>
-            </a:pPr>
-            <a:r>
-              <a:rPr lang="en-US" dirty="0">
-                <a:solidFill>
-                  <a:srgbClr val="000000"/>
-                </a:solidFill>
-                <a:latin typeface="Courier New"/>
-                <a:cs typeface="Courier New"/>
-              </a:rPr>
-              <a:t>		&lt;p&gt;For more details, keep reading.&lt;/p&gt;</a:t>
+              <a:t>&lt;p&gt;For more details, keep reading.&lt;/p&gt;</a:t>
             </a:r>
           </a:p>
           <a:p>
@@ -11379,6 +11750,13 @@
   <p:clrMapOvr>
     <a:masterClrMapping/>
   </p:clrMapOvr>
+  <p:timing>
+    <p:tnLst>
+      <p:par>
+        <p:cTn xmlns:p14="http://schemas.microsoft.com/office/powerpoint/2010/main" id="1" dur="indefinite" restart="never" nodeType="tmRoot"/>
+      </p:par>
+    </p:tnLst>
+  </p:timing>
 </p:sld>
 </file>
 
@@ -11411,53 +11789,12 @@
         </p:nvSpPr>
         <p:spPr/>
         <p:txBody>
-          <a:bodyPr>
-            <a:noAutofit/>
-          </a:bodyPr>
-          <a:lstStyle/>
-          <a:p>
-            <a:r>
-              <a:rPr lang="en-US" sz="3200" dirty="0" err="1"/>
-              <a:t>a:link</a:t>
-            </a:r>
-            <a:r>
-              <a:rPr lang="en-US" sz="3200" dirty="0"/>
-              <a:t>, </a:t>
-            </a:r>
-            <a:r>
-              <a:rPr lang="en-US" sz="3200" dirty="0" err="1"/>
-              <a:t>a:visited</a:t>
-            </a:r>
-            <a:r>
-              <a:rPr lang="en-US" sz="3200" dirty="0"/>
-              <a:t>, </a:t>
-            </a:r>
-            <a:r>
-              <a:rPr lang="en-US" sz="3200" dirty="0" err="1"/>
-              <a:t>a:active</a:t>
-            </a:r>
-            <a:r>
-              <a:rPr lang="en-US" sz="3200" dirty="0" smtClean="0"/>
-              <a:t>,</a:t>
-            </a:r>
-            <a:br>
-              <a:rPr lang="en-US" sz="3200" dirty="0" smtClean="0"/>
-            </a:br>
-            <a:r>
-              <a:rPr lang="en-US" sz="3200" dirty="0" err="1" smtClean="0"/>
-              <a:t>a:hover</a:t>
-            </a:r>
-            <a:r>
-              <a:rPr lang="en-US" sz="3200" dirty="0"/>
-              <a:t>, </a:t>
-            </a:r>
-            <a:r>
-              <a:rPr lang="en-US" sz="3200" dirty="0" err="1"/>
-              <a:t>a:focus</a:t>
-            </a:r>
-            <a:r>
-              <a:rPr lang="en-US" sz="3200" dirty="0"/>
-              <a:t> { color: black; }</a:t>
+          <a:bodyPr/>
+          <a:lstStyle/>
+          <a:p>
+            <a:r>
+              <a:rPr lang="en-US" dirty="0"/>
+              <a:t>div &gt; p { color: blue; }</a:t>
             </a:r>
           </a:p>
         </p:txBody>
@@ -11540,20 +11877,30 @@
                 <a:latin typeface="Courier New"/>
                 <a:cs typeface="Courier New"/>
               </a:rPr>
-              <a:t>	&lt;p&gt;&lt;a </a:t>
-            </a:r>
-            <a:r>
-              <a:rPr lang="en-US" dirty="0" err="1">
+              <a:t>	</a:t>
+            </a:r>
+            <a:r>
+              <a:rPr lang="en-US" b="1" dirty="0">
                 <a:solidFill>
                   <a:srgbClr val="000000"/>
                 </a:solidFill>
                 <a:latin typeface="Courier New"/>
                 <a:cs typeface="Courier New"/>
               </a:rPr>
+              <a:t>&lt;p&gt;&lt;a </a:t>
+            </a:r>
+            <a:r>
+              <a:rPr lang="en-US" b="1" dirty="0" err="1">
+                <a:solidFill>
+                  <a:srgbClr val="000000"/>
+                </a:solidFill>
+                <a:latin typeface="Courier New"/>
+                <a:cs typeface="Courier New"/>
+              </a:rPr>
               <a:t>href</a:t>
             </a:r>
             <a:r>
-              <a:rPr lang="en-US" dirty="0">
+              <a:rPr lang="en-US" b="1" dirty="0">
                 <a:solidFill>
                   <a:srgbClr val="000000"/>
                 </a:solidFill>
@@ -11563,7 +11910,7 @@
               <a:t>="http://</a:t>
             </a:r>
             <a:r>
-              <a:rPr lang="en-US" dirty="0" err="1">
+              <a:rPr lang="en-US" b="1" dirty="0" err="1">
                 <a:solidFill>
                   <a:srgbClr val="000000"/>
                 </a:solidFill>
@@ -11573,7 +11920,7 @@
               <a:t>google.com</a:t>
             </a:r>
             <a:r>
-              <a:rPr lang="en-US" dirty="0">
+              <a:rPr lang="en-US" b="1" dirty="0">
                 <a:solidFill>
                   <a:srgbClr val="000000"/>
                 </a:solidFill>
@@ -11670,6 +12017,13 @@
   <p:clrMapOvr>
     <a:masterClrMapping/>
   </p:clrMapOvr>
+  <p:timing>
+    <p:tnLst>
+      <p:par>
+        <p:cTn xmlns:p14="http://schemas.microsoft.com/office/powerpoint/2010/main" id="1" dur="indefinite" restart="never" nodeType="tmRoot"/>
+      </p:par>
+    </p:tnLst>
+  </p:timing>
 </p:sld>
 </file>
 
@@ -11703,13 +12057,52 @@
         <p:spPr/>
         <p:txBody>
           <a:bodyPr>
-            <a:normAutofit fontScale="90000"/>
+            <a:noAutofit/>
           </a:bodyPr>
           <a:lstStyle/>
           <a:p>
             <a:r>
-              <a:rPr lang="en-US" dirty="0"/>
-              <a:t>.message { background: red; }</a:t>
+              <a:rPr lang="en-US" sz="3200" dirty="0" err="1"/>
+              <a:t>a:link</a:t>
+            </a:r>
+            <a:r>
+              <a:rPr lang="en-US" sz="3200" dirty="0"/>
+              <a:t>, </a:t>
+            </a:r>
+            <a:r>
+              <a:rPr lang="en-US" sz="3200" dirty="0" err="1"/>
+              <a:t>a:visited</a:t>
+            </a:r>
+            <a:r>
+              <a:rPr lang="en-US" sz="3200" dirty="0"/>
+              <a:t>, </a:t>
+            </a:r>
+            <a:r>
+              <a:rPr lang="en-US" sz="3200" dirty="0" err="1"/>
+              <a:t>a:active</a:t>
+            </a:r>
+            <a:r>
+              <a:rPr lang="en-US" sz="3200" dirty="0" smtClean="0"/>
+              <a:t>,</a:t>
+            </a:r>
+            <a:br>
+              <a:rPr lang="en-US" sz="3200" dirty="0" smtClean="0"/>
+            </a:br>
+            <a:r>
+              <a:rPr lang="en-US" sz="3200" dirty="0" err="1" smtClean="0"/>
+              <a:t>a:hover</a:t>
+            </a:r>
+            <a:r>
+              <a:rPr lang="en-US" sz="3200" dirty="0"/>
+              <a:t>, </a:t>
+            </a:r>
+            <a:r>
+              <a:rPr lang="en-US" sz="3200" dirty="0" err="1"/>
+              <a:t>a:focus</a:t>
+            </a:r>
+            <a:r>
+              <a:rPr lang="en-US" sz="3200" dirty="0"/>
+              <a:t> { color: black; }</a:t>
             </a:r>
           </a:p>
         </p:txBody>
@@ -11792,19 +12185,59 @@
                 <a:latin typeface="Courier New"/>
                 <a:cs typeface="Courier New"/>
               </a:rPr>
-              <a:t>	&lt;p&gt;&lt;a </a:t>
-            </a:r>
-            <a:r>
-              <a:rPr lang="en-US" dirty="0" err="1">
+              <a:t>	&lt;p&gt;</a:t>
+            </a:r>
+            <a:r>
+              <a:rPr lang="en-US" b="1" dirty="0">
                 <a:solidFill>
                   <a:srgbClr val="000000"/>
                 </a:solidFill>
                 <a:latin typeface="Courier New"/>
                 <a:cs typeface="Courier New"/>
               </a:rPr>
+              <a:t>&lt;a </a:t>
+            </a:r>
+            <a:r>
+              <a:rPr lang="en-US" b="1" dirty="0" err="1">
+                <a:solidFill>
+                  <a:srgbClr val="000000"/>
+                </a:solidFill>
+                <a:latin typeface="Courier New"/>
+                <a:cs typeface="Courier New"/>
+              </a:rPr>
               <a:t>href</a:t>
             </a:r>
             <a:r>
+              <a:rPr lang="en-US" b="1" dirty="0">
+                <a:solidFill>
+                  <a:srgbClr val="000000"/>
+                </a:solidFill>
+                <a:latin typeface="Courier New"/>
+                <a:cs typeface="Courier New"/>
+              </a:rPr>
+              <a:t>="http://</a:t>
+            </a:r>
+            <a:r>
+              <a:rPr lang="en-US" b="1" dirty="0" err="1">
+                <a:solidFill>
+                  <a:srgbClr val="000000"/>
+                </a:solidFill>
+                <a:latin typeface="Courier New"/>
+                <a:cs typeface="Courier New"/>
+              </a:rPr>
+              <a:t>google.com</a:t>
+            </a:r>
+            <a:r>
+              <a:rPr lang="en-US" b="1" dirty="0">
+                <a:solidFill>
+                  <a:srgbClr val="000000"/>
+                </a:solidFill>
+                <a:latin typeface="Courier New"/>
+                <a:cs typeface="Courier New"/>
+              </a:rPr>
+              <a:t>"&gt;Visit Google&lt;/a&gt;</a:t>
+            </a:r>
+            <a:r>
               <a:rPr lang="en-US" dirty="0">
                 <a:solidFill>
                   <a:srgbClr val="000000"/>
@@ -11812,27 +12245,7 @@
                 <a:latin typeface="Courier New"/>
                 <a:cs typeface="Courier New"/>
               </a:rPr>
-              <a:t>="http://</a:t>
-            </a:r>
-            <a:r>
-              <a:rPr lang="en-US" dirty="0" err="1">
-                <a:solidFill>
-                  <a:srgbClr val="000000"/>
-                </a:solidFill>
-                <a:latin typeface="Courier New"/>
-                <a:cs typeface="Courier New"/>
-              </a:rPr>
-              <a:t>google.com</a:t>
-            </a:r>
-            <a:r>
-              <a:rPr lang="en-US" dirty="0">
-                <a:solidFill>
-                  <a:srgbClr val="000000"/>
-                </a:solidFill>
-                <a:latin typeface="Courier New"/>
-                <a:cs typeface="Courier New"/>
-              </a:rPr>
-              <a:t>"&gt;Visit Google&lt;/a&gt; if you want a search engine.&lt;/p&gt;</a:t>
+              <a:t> if you want a search engine.&lt;/p&gt;</a:t>
             </a:r>
           </a:p>
           <a:p>
@@ -11922,6 +12335,13 @@
   <p:clrMapOvr>
     <a:masterClrMapping/>
   </p:clrMapOvr>
+  <p:timing>
+    <p:tnLst>
+      <p:par>
+        <p:cTn xmlns:p14="http://schemas.microsoft.com/office/powerpoint/2010/main" id="1" dur="indefinite" restart="never" nodeType="tmRoot"/>
+      </p:par>
+    </p:tnLst>
+  </p:timing>
 </p:sld>
 </file>
 
@@ -11954,12 +12374,14 @@
         </p:nvSpPr>
         <p:spPr/>
         <p:txBody>
-          <a:bodyPr/>
+          <a:bodyPr>
+            <a:normAutofit fontScale="90000"/>
+          </a:bodyPr>
           <a:lstStyle/>
           <a:p>
             <a:r>
               <a:rPr lang="en-US" dirty="0"/>
-              <a:t>#content { width: 200px; }</a:t>
+              <a:t>.message { background: red; }</a:t>
             </a:r>
           </a:p>
         </p:txBody>
@@ -12097,7 +12519,17 @@
                 <a:latin typeface="Courier New"/>
                 <a:cs typeface="Courier New"/>
               </a:rPr>
-              <a:t>	&lt;span class="message"&gt;</a:t>
+              <a:t>	</a:t>
+            </a:r>
+            <a:r>
+              <a:rPr lang="en-US" b="1" dirty="0">
+                <a:solidFill>
+                  <a:srgbClr val="000000"/>
+                </a:solidFill>
+                <a:latin typeface="Courier New"/>
+                <a:cs typeface="Courier New"/>
+              </a:rPr>
+              <a:t>&lt;span class="message"&gt;</a:t>
             </a:r>
           </a:p>
           <a:p>
@@ -12105,7 +12537,7 @@
               <a:buNone/>
             </a:pPr>
             <a:r>
-              <a:rPr lang="en-US" dirty="0">
+              <a:rPr lang="en-US" b="1" dirty="0">
                 <a:solidFill>
                   <a:srgbClr val="000000"/>
                 </a:solidFill>
@@ -12120,7 +12552,7 @@
               <a:buNone/>
             </a:pPr>
             <a:r>
-              <a:rPr lang="en-US" dirty="0">
+              <a:rPr lang="en-US" b="1" dirty="0">
                 <a:solidFill>
                   <a:srgbClr val="000000"/>
                 </a:solidFill>
@@ -12172,6 +12604,13 @@
   <p:clrMapOvr>
     <a:masterClrMapping/>
   </p:clrMapOvr>
+  <p:timing>
+    <p:tnLst>
+      <p:par>
+        <p:cTn xmlns:p14="http://schemas.microsoft.com/office/powerpoint/2010/main" id="1" dur="indefinite" restart="never" nodeType="tmRoot"/>
+      </p:par>
+    </p:tnLst>
+  </p:timing>
 </p:sld>
 </file>
 
@@ -12208,10 +12647,9 @@
           <a:lstStyle/>
           <a:p>
             <a:r>
-              <a:rPr lang="en-US" dirty="0" smtClean="0"/>
-              <a:t>Example</a:t>
-            </a:r>
-            <a:endParaRPr lang="en-US" dirty="0"/>
+              <a:rPr lang="en-US" dirty="0"/>
+              <a:t>#content { width: 200px; }</a:t>
+            </a:r>
           </a:p>
         </p:txBody>
       </p:sp>
@@ -12222,13 +12660,18 @@
             <a:spLocks noGrp="1"/>
           </p:cNvSpPr>
           <p:nvPr>
-            <p:ph sz="quarter" idx="13"/>
-          </p:nvPr>
-        </p:nvSpPr>
-        <p:spPr/>
+            <p:ph idx="1"/>
+          </p:nvPr>
+        </p:nvSpPr>
+        <p:spPr>
+          <a:xfrm>
+            <a:off x="1062217" y="2119257"/>
+            <a:ext cx="6998052" cy="3603812"/>
+          </a:xfrm>
+        </p:spPr>
         <p:txBody>
           <a:bodyPr>
-            <a:normAutofit/>
+            <a:normAutofit fontScale="85000" lnSpcReduction="10000"/>
           </a:bodyPr>
           <a:lstStyle/>
           <a:p>
@@ -12236,7 +12679,7 @@
               <a:buNone/>
             </a:pPr>
             <a:r>
-              <a:rPr lang="en-US" sz="1400" dirty="0">
+              <a:rPr lang="en-US" dirty="0">
                 <a:solidFill>
                   <a:srgbClr val="000000"/>
                 </a:solidFill>
@@ -12251,7 +12694,7 @@
               <a:buNone/>
             </a:pPr>
             <a:r>
-              <a:rPr lang="en-US" sz="1400" dirty="0">
+              <a:rPr lang="en-US" dirty="0">
                 <a:solidFill>
                   <a:srgbClr val="000000"/>
                 </a:solidFill>
@@ -12266,7 +12709,7 @@
               <a:buNone/>
             </a:pPr>
             <a:r>
-              <a:rPr lang="en-US" sz="1400" dirty="0">
+              <a:rPr lang="en-US" b="1" dirty="0">
                 <a:solidFill>
                   <a:srgbClr val="000000"/>
                 </a:solidFill>
@@ -12281,7 +12724,7 @@
               <a:buNone/>
             </a:pPr>
             <a:r>
-              <a:rPr lang="en-US" sz="1400" dirty="0">
+              <a:rPr lang="en-US" b="1" dirty="0">
                 <a:solidFill>
                   <a:srgbClr val="000000"/>
                 </a:solidFill>
@@ -12291,7 +12734,7 @@
               <a:t>	&lt;p&gt;&lt;a </a:t>
             </a:r>
             <a:r>
-              <a:rPr lang="en-US" sz="1400" dirty="0" err="1">
+              <a:rPr lang="en-US" b="1" dirty="0" err="1">
                 <a:solidFill>
                   <a:srgbClr val="000000"/>
                 </a:solidFill>
@@ -12301,7 +12744,7 @@
               <a:t>href</a:t>
             </a:r>
             <a:r>
-              <a:rPr lang="en-US" sz="1400" dirty="0">
+              <a:rPr lang="en-US" b="1" dirty="0">
                 <a:solidFill>
                   <a:srgbClr val="000000"/>
                 </a:solidFill>
@@ -12311,7 +12754,7 @@
               <a:t>="http://</a:t>
             </a:r>
             <a:r>
-              <a:rPr lang="en-US" sz="1400" dirty="0" err="1">
+              <a:rPr lang="en-US" b="1" dirty="0" err="1">
                 <a:solidFill>
                   <a:srgbClr val="000000"/>
                 </a:solidFill>
@@ -12321,7 +12764,7 @@
               <a:t>google.com</a:t>
             </a:r>
             <a:r>
-              <a:rPr lang="en-US" sz="1400" dirty="0">
+              <a:rPr lang="en-US" b="1" dirty="0">
                 <a:solidFill>
                   <a:srgbClr val="000000"/>
                 </a:solidFill>
@@ -12336,7 +12779,7 @@
               <a:buNone/>
             </a:pPr>
             <a:r>
-              <a:rPr lang="en-US" sz="1400" dirty="0">
+              <a:rPr lang="en-US" b="1" dirty="0">
                 <a:solidFill>
                   <a:srgbClr val="000000"/>
                 </a:solidFill>
@@ -12351,7 +12794,7 @@
               <a:buNone/>
             </a:pPr>
             <a:r>
-              <a:rPr lang="en-US" sz="1400" dirty="0">
+              <a:rPr lang="en-US" b="1" dirty="0">
                 <a:solidFill>
                   <a:srgbClr val="000000"/>
                 </a:solidFill>
@@ -12366,7 +12809,7 @@
               <a:buNone/>
             </a:pPr>
             <a:r>
-              <a:rPr lang="en-US" sz="1400" dirty="0">
+              <a:rPr lang="en-US" b="1" dirty="0">
                 <a:solidFill>
                   <a:srgbClr val="000000"/>
                 </a:solidFill>
@@ -12381,7 +12824,7 @@
               <a:buNone/>
             </a:pPr>
             <a:r>
-              <a:rPr lang="en-US" sz="1400" dirty="0">
+              <a:rPr lang="en-US" b="1" dirty="0">
                 <a:solidFill>
                   <a:srgbClr val="000000"/>
                 </a:solidFill>
@@ -12396,7 +12839,7 @@
               <a:buNone/>
             </a:pPr>
             <a:r>
-              <a:rPr lang="en-US" sz="1400" dirty="0">
+              <a:rPr lang="en-US" dirty="0">
                 <a:solidFill>
                   <a:srgbClr val="000000"/>
                 </a:solidFill>
@@ -12404,219 +12847,6 @@
                 <a:cs typeface="Courier New"/>
               </a:rPr>
               <a:t>&lt;/body&gt;</a:t>
-            </a:r>
-          </a:p>
-        </p:txBody>
-      </p:sp>
-      <p:sp>
-        <p:nvSpPr>
-          <p:cNvPr id="4" name="Content Placeholder 3"/>
-          <p:cNvSpPr>
-            <a:spLocks noGrp="1"/>
-          </p:cNvSpPr>
-          <p:nvPr>
-            <p:ph sz="quarter" idx="14"/>
-          </p:nvPr>
-        </p:nvSpPr>
-        <p:spPr/>
-        <p:txBody>
-          <a:bodyPr>
-            <a:noAutofit/>
-          </a:bodyPr>
-          <a:lstStyle/>
-          <a:p>
-            <a:pPr marL="0" indent="0">
-              <a:buNone/>
-            </a:pPr>
-            <a:r>
-              <a:rPr lang="en-US" sz="1400" dirty="0">
-                <a:solidFill>
-                  <a:srgbClr val="000000"/>
-                </a:solidFill>
-                <a:latin typeface="Courier New"/>
-                <a:cs typeface="Courier New"/>
-              </a:rPr>
-              <a:t>* { margin: 0; padding: 0; }</a:t>
-            </a:r>
-          </a:p>
-          <a:p>
-            <a:pPr marL="0" indent="0">
-              <a:buNone/>
-            </a:pPr>
-            <a:r>
-              <a:rPr lang="en-US" sz="1400" dirty="0">
-                <a:solidFill>
-                  <a:srgbClr val="000000"/>
-                </a:solidFill>
-                <a:latin typeface="Courier New"/>
-                <a:cs typeface="Courier New"/>
-              </a:rPr>
-              <a:t>p { padding-bottom: 10px; }</a:t>
-            </a:r>
-          </a:p>
-          <a:p>
-            <a:pPr marL="0" indent="0">
-              <a:buNone/>
-            </a:pPr>
-            <a:r>
-              <a:rPr lang="en-US" sz="1400" dirty="0">
-                <a:solidFill>
-                  <a:srgbClr val="000000"/>
-                </a:solidFill>
-                <a:latin typeface="Courier New"/>
-                <a:cs typeface="Courier New"/>
-              </a:rPr>
-              <a:t>div p { color: green; }</a:t>
-            </a:r>
-          </a:p>
-          <a:p>
-            <a:pPr marL="0" indent="0">
-              <a:buNone/>
-            </a:pPr>
-            <a:r>
-              <a:rPr lang="en-US" sz="1400" dirty="0">
-                <a:solidFill>
-                  <a:srgbClr val="000000"/>
-                </a:solidFill>
-                <a:latin typeface="Courier New"/>
-                <a:cs typeface="Courier New"/>
-              </a:rPr>
-              <a:t>div &gt; p { color: blue; }</a:t>
-            </a:r>
-          </a:p>
-          <a:p>
-            <a:pPr marL="0" indent="0">
-              <a:buNone/>
-            </a:pPr>
-            <a:r>
-              <a:rPr lang="en-US" sz="1400" dirty="0" err="1">
-                <a:solidFill>
-                  <a:srgbClr val="000000"/>
-                </a:solidFill>
-                <a:latin typeface="Courier New"/>
-                <a:cs typeface="Courier New"/>
-              </a:rPr>
-              <a:t>a:link</a:t>
-            </a:r>
-            <a:r>
-              <a:rPr lang="en-US" sz="1400" dirty="0">
-                <a:solidFill>
-                  <a:srgbClr val="000000"/>
-                </a:solidFill>
-                <a:latin typeface="Courier New"/>
-                <a:cs typeface="Courier New"/>
-              </a:rPr>
-              <a:t>, </a:t>
-            </a:r>
-            <a:r>
-              <a:rPr lang="en-US" sz="1400" dirty="0" err="1">
-                <a:solidFill>
-                  <a:srgbClr val="000000"/>
-                </a:solidFill>
-                <a:latin typeface="Courier New"/>
-                <a:cs typeface="Courier New"/>
-              </a:rPr>
-              <a:t>a:visited</a:t>
-            </a:r>
-            <a:r>
-              <a:rPr lang="en-US" sz="1400" dirty="0">
-                <a:solidFill>
-                  <a:srgbClr val="000000"/>
-                </a:solidFill>
-                <a:latin typeface="Courier New"/>
-                <a:cs typeface="Courier New"/>
-              </a:rPr>
-              <a:t>, </a:t>
-            </a:r>
-            <a:r>
-              <a:rPr lang="en-US" sz="1400" dirty="0" err="1">
-                <a:solidFill>
-                  <a:srgbClr val="000000"/>
-                </a:solidFill>
-                <a:latin typeface="Courier New"/>
-                <a:cs typeface="Courier New"/>
-              </a:rPr>
-              <a:t>a:active</a:t>
-            </a:r>
-            <a:r>
-              <a:rPr lang="en-US" sz="1400" dirty="0">
-                <a:solidFill>
-                  <a:srgbClr val="000000"/>
-                </a:solidFill>
-                <a:latin typeface="Courier New"/>
-                <a:cs typeface="Courier New"/>
-              </a:rPr>
-              <a:t>, </a:t>
-            </a:r>
-            <a:r>
-              <a:rPr lang="en-US" sz="1400" dirty="0" err="1">
-                <a:solidFill>
-                  <a:srgbClr val="000000"/>
-                </a:solidFill>
-                <a:latin typeface="Courier New"/>
-                <a:cs typeface="Courier New"/>
-              </a:rPr>
-              <a:t>a:hover</a:t>
-            </a:r>
-            <a:r>
-              <a:rPr lang="en-US" sz="1400" dirty="0">
-                <a:solidFill>
-                  <a:srgbClr val="000000"/>
-                </a:solidFill>
-                <a:latin typeface="Courier New"/>
-                <a:cs typeface="Courier New"/>
-              </a:rPr>
-              <a:t>, </a:t>
-            </a:r>
-            <a:r>
-              <a:rPr lang="en-US" sz="1400" dirty="0" err="1">
-                <a:solidFill>
-                  <a:srgbClr val="000000"/>
-                </a:solidFill>
-                <a:latin typeface="Courier New"/>
-                <a:cs typeface="Courier New"/>
-              </a:rPr>
-              <a:t>a:focus</a:t>
-            </a:r>
-            <a:r>
-              <a:rPr lang="en-US" sz="1400" dirty="0">
-                <a:solidFill>
-                  <a:srgbClr val="000000"/>
-                </a:solidFill>
-                <a:latin typeface="Courier New"/>
-                <a:cs typeface="Courier New"/>
-              </a:rPr>
-              <a:t> { color: black; }</a:t>
-            </a:r>
-          </a:p>
-          <a:p>
-            <a:pPr marL="0" indent="0">
-              <a:buNone/>
-            </a:pPr>
-            <a:r>
-              <a:rPr lang="en-US" sz="1400" dirty="0">
-                <a:solidFill>
-                  <a:srgbClr val="000000"/>
-                </a:solidFill>
-                <a:latin typeface="Courier New"/>
-                <a:cs typeface="Courier New"/>
-              </a:rPr>
-              <a:t>.message { background: red; }</a:t>
-            </a:r>
-          </a:p>
-          <a:p>
-            <a:pPr marL="0" indent="0">
-              <a:buNone/>
-            </a:pPr>
-            <a:r>
-              <a:rPr lang="en-US" sz="1400" dirty="0">
-                <a:solidFill>
-                  <a:srgbClr val="000000"/>
-                </a:solidFill>
-                <a:latin typeface="Courier New"/>
-                <a:cs typeface="Courier New"/>
-              </a:rPr>
-              <a:t>#content { width: 200px; }</a:t>
             </a:r>
           </a:p>
         </p:txBody>
@@ -12624,13 +12854,20 @@
     </p:spTree>
     <p:extLst>
       <p:ext uri="{BB962C8B-B14F-4D97-AF65-F5344CB8AC3E}">
-        <p14:creationId xmlns:p14="http://schemas.microsoft.com/office/powerpoint/2010/main" val="1946796893"/>
+        <p14:creationId xmlns:p14="http://schemas.microsoft.com/office/powerpoint/2010/main" val="2114841051"/>
       </p:ext>
     </p:extLst>
   </p:cSld>
   <p:clrMapOvr>
     <a:masterClrMapping/>
   </p:clrMapOvr>
+  <p:timing>
+    <p:tnLst>
+      <p:par>
+        <p:cTn xmlns:p14="http://schemas.microsoft.com/office/powerpoint/2010/main" id="1" dur="indefinite" restart="never" nodeType="tmRoot"/>
+      </p:par>
+    </p:tnLst>
+  </p:timing>
 </p:sld>
 </file>
 
@@ -13086,6 +13323,13 @@
   <p:clrMapOvr>
     <a:masterClrMapping/>
   </p:clrMapOvr>
+  <p:timing>
+    <p:tnLst>
+      <p:par>
+        <p:cTn xmlns:p14="http://schemas.microsoft.com/office/powerpoint/2010/main" id="1" dur="indefinite" restart="never" nodeType="tmRoot"/>
+      </p:par>
+    </p:tnLst>
+  </p:timing>
 </p:sld>
 </file>
 
@@ -13108,7 +13352,7 @@
       </p:grpSpPr>
       <p:sp>
         <p:nvSpPr>
-          <p:cNvPr id="3" name="Title 2"/>
+          <p:cNvPr id="4" name="Title 3"/>
           <p:cNvSpPr>
             <a:spLocks noGrp="1"/>
           </p:cNvSpPr>
@@ -13118,12 +13362,37 @@
         </p:nvSpPr>
         <p:spPr/>
         <p:txBody>
+          <a:bodyPr>
+            <a:normAutofit fontScale="90000"/>
+          </a:bodyPr>
+          <a:lstStyle/>
+          <a:p>
+            <a:r>
+              <a:rPr lang="en-US" dirty="0" smtClean="0"/>
+              <a:t>Exercise / Activity</a:t>
+            </a:r>
+            <a:endParaRPr lang="en-US" dirty="0"/>
+          </a:p>
+        </p:txBody>
+      </p:sp>
+      <p:sp>
+        <p:nvSpPr>
+          <p:cNvPr id="5" name="Text Placeholder 4"/>
+          <p:cNvSpPr>
+            <a:spLocks noGrp="1"/>
+          </p:cNvSpPr>
+          <p:nvPr>
+            <p:ph type="body" idx="1"/>
+          </p:nvPr>
+        </p:nvSpPr>
+        <p:spPr/>
+        <p:txBody>
           <a:bodyPr/>
           <a:lstStyle/>
           <a:p>
             <a:r>
               <a:rPr lang="en-US" dirty="0" smtClean="0"/>
-              <a:t>Break</a:t>
+              <a:t>Layout</a:t>
             </a:r>
             <a:endParaRPr lang="en-US" dirty="0"/>
           </a:p>
@@ -13131,12 +13400,12 @@
       </p:sp>
       <p:sp>
         <p:nvSpPr>
-          <p:cNvPr id="4" name="Text Placeholder 3"/>
-          <p:cNvSpPr>
-            <a:spLocks noGrp="1"/>
-          </p:cNvSpPr>
-          <p:nvPr>
-            <p:ph type="body" idx="1"/>
+          <p:cNvPr id="6" name="Text Placeholder 5"/>
+          <p:cNvSpPr>
+            <a:spLocks noGrp="1"/>
+          </p:cNvSpPr>
+          <p:nvPr>
+            <p:ph type="body" sz="quarter" idx="3"/>
           </p:nvPr>
         </p:nvSpPr>
         <p:spPr/>
@@ -13144,14 +13413,137 @@
           <a:bodyPr/>
           <a:lstStyle/>
           <a:p>
-            <a:endParaRPr lang="en-US"/>
+            <a:r>
+              <a:rPr lang="en-US" dirty="0" smtClean="0"/>
+              <a:t>Color &amp; Typography</a:t>
+            </a:r>
+            <a:endParaRPr lang="en-US" dirty="0"/>
+          </a:p>
+        </p:txBody>
+      </p:sp>
+      <p:sp>
+        <p:nvSpPr>
+          <p:cNvPr id="7" name="Content Placeholder 6"/>
+          <p:cNvSpPr>
+            <a:spLocks noGrp="1"/>
+          </p:cNvSpPr>
+          <p:nvPr>
+            <p:ph sz="quarter" idx="13"/>
+          </p:nvPr>
+        </p:nvSpPr>
+        <p:spPr/>
+        <p:txBody>
+          <a:bodyPr/>
+          <a:lstStyle/>
+          <a:p>
+            <a:pPr>
+              <a:buFont typeface="Wingdings" charset="2"/>
+              <a:buChar char="v"/>
+            </a:pPr>
+            <a:r>
+              <a:rPr lang="en-US" dirty="0" smtClean="0"/>
+              <a:t>Move something</a:t>
+            </a:r>
+          </a:p>
+          <a:p>
+            <a:pPr>
+              <a:buFont typeface="Wingdings" charset="2"/>
+              <a:buChar char="v"/>
+            </a:pPr>
+            <a:r>
+              <a:rPr lang="en-US" dirty="0" smtClean="0"/>
+              <a:t>Hide something</a:t>
+            </a:r>
+          </a:p>
+          <a:p>
+            <a:pPr>
+              <a:buFont typeface="Wingdings" charset="2"/>
+              <a:buChar char="v"/>
+            </a:pPr>
+            <a:r>
+              <a:rPr lang="en-US" dirty="0" smtClean="0"/>
+              <a:t>Change width, height</a:t>
+            </a:r>
+          </a:p>
+          <a:p>
+            <a:pPr>
+              <a:buFont typeface="Wingdings" charset="2"/>
+              <a:buChar char="v"/>
+            </a:pPr>
+            <a:r>
+              <a:rPr lang="en-US" dirty="0" smtClean="0"/>
+              <a:t>Change margin, padding</a:t>
+            </a:r>
+          </a:p>
+          <a:p>
+            <a:pPr>
+              <a:buFont typeface="Wingdings" charset="2"/>
+              <a:buChar char="v"/>
+            </a:pPr>
+            <a:r>
+              <a:rPr lang="en-US" dirty="0" smtClean="0"/>
+              <a:t>Float something</a:t>
+            </a:r>
+          </a:p>
+          <a:p>
+            <a:pPr>
+              <a:buFont typeface="Wingdings" charset="2"/>
+              <a:buChar char="v"/>
+            </a:pPr>
+            <a:r>
+              <a:rPr lang="en-US" dirty="0" smtClean="0"/>
+              <a:t>Change list-style</a:t>
+            </a:r>
+          </a:p>
+        </p:txBody>
+      </p:sp>
+      <p:sp>
+        <p:nvSpPr>
+          <p:cNvPr id="8" name="Content Placeholder 7"/>
+          <p:cNvSpPr>
+            <a:spLocks noGrp="1"/>
+          </p:cNvSpPr>
+          <p:nvPr>
+            <p:ph sz="quarter" idx="14"/>
+          </p:nvPr>
+        </p:nvSpPr>
+        <p:spPr/>
+        <p:txBody>
+          <a:bodyPr/>
+          <a:lstStyle/>
+          <a:p>
+            <a:r>
+              <a:rPr lang="en-US" dirty="0" smtClean="0"/>
+              <a:t>Change color, background</a:t>
+            </a:r>
+          </a:p>
+          <a:p>
+            <a:r>
+              <a:rPr lang="en-US" dirty="0" smtClean="0"/>
+              <a:t>Add border</a:t>
+            </a:r>
+          </a:p>
+          <a:p>
+            <a:r>
+              <a:rPr lang="en-US" dirty="0" smtClean="0"/>
+              <a:t>Make italic, bold, uppercase, small caps</a:t>
+            </a:r>
+          </a:p>
+          <a:p>
+            <a:r>
+              <a:rPr lang="en-US" dirty="0" smtClean="0"/>
+              <a:t>Change font size, family, alignment</a:t>
+            </a:r>
+          </a:p>
+          <a:p>
+            <a:endParaRPr lang="en-US" dirty="0"/>
           </a:p>
         </p:txBody>
       </p:sp>
     </p:spTree>
     <p:extLst>
       <p:ext uri="{BB962C8B-B14F-4D97-AF65-F5344CB8AC3E}">
-        <p14:creationId xmlns:p14="http://schemas.microsoft.com/office/powerpoint/2010/main" val="3610379708"/>
+        <p14:creationId xmlns:p14="http://schemas.microsoft.com/office/powerpoint/2010/main" val="276724819"/>
       </p:ext>
     </p:extLst>
   </p:cSld>
@@ -13187,12 +13579,12 @@
       </p:grpSpPr>
       <p:sp>
         <p:nvSpPr>
-          <p:cNvPr id="2" name="Title 1"/>
-          <p:cNvSpPr>
-            <a:spLocks noGrp="1"/>
-          </p:cNvSpPr>
-          <p:nvPr>
-            <p:ph type="ctrTitle"/>
+          <p:cNvPr id="3" name="Title 2"/>
+          <p:cNvSpPr>
+            <a:spLocks noGrp="1"/>
+          </p:cNvSpPr>
+          <p:nvPr>
+            <p:ph type="title"/>
           </p:nvPr>
         </p:nvSpPr>
         <p:spPr/>
@@ -13202,7 +13594,7 @@
           <a:p>
             <a:r>
               <a:rPr lang="en-US" dirty="0" smtClean="0"/>
-              <a:t>Lesson: Chapter 2</a:t>
+              <a:t>Break</a:t>
             </a:r>
             <a:endParaRPr lang="en-US" dirty="0"/>
           </a:p>
@@ -13210,12 +13602,12 @@
       </p:sp>
       <p:sp>
         <p:nvSpPr>
-          <p:cNvPr id="3" name="Subtitle 2"/>
-          <p:cNvSpPr>
-            <a:spLocks noGrp="1"/>
-          </p:cNvSpPr>
-          <p:nvPr>
-            <p:ph type="subTitle" idx="1"/>
+          <p:cNvPr id="4" name="Text Placeholder 3"/>
+          <p:cNvSpPr>
+            <a:spLocks noGrp="1"/>
+          </p:cNvSpPr>
+          <p:nvPr>
+            <p:ph type="body" idx="1"/>
           </p:nvPr>
         </p:nvSpPr>
         <p:spPr/>
@@ -13223,22 +13615,14 @@
           <a:bodyPr/>
           <a:lstStyle/>
           <a:p>
-            <a:r>
-              <a:rPr lang="en-US" dirty="0"/>
-              <a:t>Pre-production (Part </a:t>
-            </a:r>
-            <a:r>
-              <a:rPr lang="en-US" dirty="0" smtClean="0"/>
-              <a:t>I)</a:t>
-            </a:r>
-            <a:endParaRPr lang="en-US" dirty="0"/>
+            <a:endParaRPr lang="en-US"/>
           </a:p>
         </p:txBody>
       </p:sp>
     </p:spTree>
     <p:extLst>
       <p:ext uri="{BB962C8B-B14F-4D97-AF65-F5344CB8AC3E}">
-        <p14:creationId xmlns:p14="http://schemas.microsoft.com/office/powerpoint/2010/main" val="1158543244"/>
+        <p14:creationId xmlns:p14="http://schemas.microsoft.com/office/powerpoint/2010/main" val="3610379708"/>
       </p:ext>
     </p:extLst>
   </p:cSld>
@@ -13279,7 +13663,7 @@
             <a:spLocks noGrp="1"/>
           </p:cNvSpPr>
           <p:nvPr>
-            <p:ph type="title"/>
+            <p:ph type="ctrTitle"/>
           </p:nvPr>
         </p:nvSpPr>
         <p:spPr/>
@@ -13289,7 +13673,7 @@
           <a:p>
             <a:r>
               <a:rPr lang="en-US" dirty="0" smtClean="0"/>
-              <a:t>Visual Metaphor</a:t>
+              <a:t>Lesson: Chapter 2</a:t>
             </a:r>
             <a:endParaRPr lang="en-US" dirty="0"/>
           </a:p>
@@ -13297,12 +13681,12 @@
       </p:sp>
       <p:sp>
         <p:nvSpPr>
-          <p:cNvPr id="3" name="Content Placeholder 2"/>
-          <p:cNvSpPr>
-            <a:spLocks noGrp="1"/>
-          </p:cNvSpPr>
-          <p:nvPr>
-            <p:ph idx="1"/>
+          <p:cNvPr id="3" name="Subtitle 2"/>
+          <p:cNvSpPr>
+            <a:spLocks noGrp="1"/>
+          </p:cNvSpPr>
+          <p:nvPr>
+            <p:ph type="subTitle" idx="1"/>
           </p:nvPr>
         </p:nvSpPr>
         <p:spPr/>
@@ -13311,59 +13695,34 @@
           <a:lstStyle/>
           <a:p>
             <a:r>
-              <a:rPr lang="en-US" dirty="0" smtClean="0"/>
-              <a:t>Takes advantage of familiar visual elements</a:t>
-            </a:r>
-          </a:p>
-          <a:p>
-            <a:r>
-              <a:rPr lang="en-US" dirty="0" smtClean="0"/>
-              <a:t>Reinforces the site's theme</a:t>
-            </a:r>
-          </a:p>
-          <a:p>
-            <a:r>
-              <a:rPr lang="en-US" dirty="0" smtClean="0"/>
-              <a:t>Literal interpretation or nuances</a:t>
-            </a:r>
-          </a:p>
-          <a:p>
-            <a:r>
-              <a:rPr lang="en-US" dirty="0" smtClean="0"/>
-              <a:t>Examples</a:t>
-            </a:r>
-          </a:p>
-          <a:p>
-            <a:pPr lvl="1"/>
-            <a:r>
-              <a:rPr lang="en-US" dirty="0" smtClean="0"/>
-              <a:t>Corkboard for a job posting website</a:t>
+              <a:rPr lang="en-US" dirty="0"/>
+              <a:t>Pre-production (Part </a:t>
+            </a:r>
+            <a:r>
+              <a:rPr lang="en-US" dirty="0" smtClean="0"/>
+              <a:t>I)</a:t>
             </a:r>
             <a:endParaRPr lang="en-US" dirty="0"/>
-          </a:p>
-          <a:p>
-            <a:pPr lvl="1"/>
-            <a:r>
-              <a:rPr lang="en-US" dirty="0" err="1" smtClean="0"/>
-              <a:t>Wirebound</a:t>
-            </a:r>
-            <a:r>
-              <a:rPr lang="en-US" dirty="0" smtClean="0"/>
-              <a:t> notebook for blog</a:t>
-            </a:r>
           </a:p>
         </p:txBody>
       </p:sp>
     </p:spTree>
     <p:extLst>
       <p:ext uri="{BB962C8B-B14F-4D97-AF65-F5344CB8AC3E}">
-        <p14:creationId xmlns:p14="http://schemas.microsoft.com/office/powerpoint/2010/main" val="2932359442"/>
+        <p14:creationId xmlns:p14="http://schemas.microsoft.com/office/powerpoint/2010/main" val="1158543244"/>
       </p:ext>
     </p:extLst>
   </p:cSld>
   <p:clrMapOvr>
     <a:masterClrMapping/>
   </p:clrMapOvr>
+  <p:timing>
+    <p:tnLst>
+      <p:par>
+        <p:cTn xmlns:p14="http://schemas.microsoft.com/office/powerpoint/2010/main" id="1" dur="indefinite" restart="never" nodeType="tmRoot"/>
+      </p:par>
+    </p:tnLst>
+  </p:timing>
 </p:sld>
 </file>
 
@@ -13401,7 +13760,7 @@
           <a:p>
             <a:r>
               <a:rPr lang="en-US" dirty="0" smtClean="0"/>
-              <a:t>Theme</a:t>
+              <a:t>Visual Metaphor</a:t>
             </a:r>
             <a:endParaRPr lang="en-US" dirty="0"/>
           </a:p>
@@ -13424,40 +13783,65 @@
           <a:p>
             <a:r>
               <a:rPr lang="en-US" dirty="0" smtClean="0"/>
-              <a:t>Represents your site's purpose and content</a:t>
-            </a:r>
-          </a:p>
-          <a:p>
+              <a:t>Takes advantage of familiar visual elements</a:t>
+            </a:r>
+          </a:p>
+          <a:p>
+            <a:r>
+              <a:rPr lang="en-US" dirty="0" smtClean="0"/>
+              <a:t>Reinforces the site's theme</a:t>
+            </a:r>
+          </a:p>
+          <a:p>
+            <a:r>
+              <a:rPr lang="en-US" dirty="0" smtClean="0"/>
+              <a:t>Literal interpretation or nuances</a:t>
+            </a:r>
+          </a:p>
+          <a:p>
+            <a:r>
+              <a:rPr lang="en-US" dirty="0" smtClean="0"/>
+              <a:t>Examples</a:t>
+            </a:r>
+          </a:p>
+          <a:p>
+            <a:pPr lvl="1"/>
+            <a:r>
+              <a:rPr lang="en-US" dirty="0" smtClean="0"/>
+              <a:t>Corkboard for a job posting website</a:t>
+            </a:r>
+            <a:endParaRPr lang="en-US" dirty="0"/>
+          </a:p>
+          <a:p>
+            <a:pPr lvl="1"/>
             <a:r>
               <a:rPr lang="en-US" dirty="0" err="1" smtClean="0"/>
-              <a:t>Amazon.com</a:t>
-            </a:r>
-            <a:r>
-              <a:rPr lang="en-US" dirty="0" smtClean="0"/>
-              <a:t>: an online merchant that focuses on books</a:t>
-            </a:r>
-          </a:p>
-          <a:p>
-            <a:r>
-              <a:rPr lang="en-US" dirty="0" smtClean="0"/>
-              <a:t>Visual metaphor reinforces the theme</a:t>
-            </a:r>
-          </a:p>
-          <a:p>
-            <a:endParaRPr lang="en-US" dirty="0"/>
+              <a:t>Wirebound</a:t>
+            </a:r>
+            <a:r>
+              <a:rPr lang="en-US" dirty="0" smtClean="0"/>
+              <a:t> notebook for blog</a:t>
+            </a:r>
           </a:p>
         </p:txBody>
       </p:sp>
     </p:spTree>
     <p:extLst>
       <p:ext uri="{BB962C8B-B14F-4D97-AF65-F5344CB8AC3E}">
-        <p14:creationId xmlns:p14="http://schemas.microsoft.com/office/powerpoint/2010/main" val="3270696722"/>
+        <p14:creationId xmlns:p14="http://schemas.microsoft.com/office/powerpoint/2010/main" val="2932359442"/>
       </p:ext>
     </p:extLst>
   </p:cSld>
   <p:clrMapOvr>
     <a:masterClrMapping/>
   </p:clrMapOvr>
+  <p:timing>
+    <p:tnLst>
+      <p:par>
+        <p:cTn xmlns:p14="http://schemas.microsoft.com/office/powerpoint/2010/main" id="1" dur="indefinite" restart="never" nodeType="tmRoot"/>
+      </p:par>
+    </p:tnLst>
+  </p:timing>
 </p:sld>
 </file>
 
@@ -13495,7 +13879,7 @@
           <a:p>
             <a:r>
               <a:rPr lang="en-US" dirty="0" smtClean="0"/>
-              <a:t>Brainstorming</a:t>
+              <a:t>Theme</a:t>
             </a:r>
             <a:endParaRPr lang="en-US" dirty="0"/>
           </a:p>
@@ -13518,44 +13902,47 @@
           <a:p>
             <a:r>
               <a:rPr lang="en-US" dirty="0" smtClean="0"/>
-              <a:t>Helps develop visual metaphor</a:t>
-            </a:r>
-          </a:p>
-          <a:p>
-            <a:r>
-              <a:rPr lang="en-US" dirty="0" smtClean="0"/>
-              <a:t>Free-flow writing of ideas and thoughts</a:t>
-            </a:r>
-          </a:p>
-          <a:p>
-            <a:r>
-              <a:rPr lang="en-US" dirty="0" smtClean="0"/>
-              <a:t>Don't hold back; write everything</a:t>
-            </a:r>
-          </a:p>
-          <a:p>
-            <a:r>
-              <a:rPr lang="en-US" dirty="0" smtClean="0"/>
-              <a:t>Can be done several times for </a:t>
-            </a:r>
-            <a:r>
-              <a:rPr lang="en-US" smtClean="0"/>
-              <a:t>one project</a:t>
-            </a:r>
-            <a:endParaRPr lang="en-US"/>
+              <a:t>Represents your site's purpose and content</a:t>
+            </a:r>
+          </a:p>
+          <a:p>
+            <a:r>
+              <a:rPr lang="en-US" dirty="0" err="1" smtClean="0"/>
+              <a:t>Amazon.com</a:t>
+            </a:r>
+            <a:r>
+              <a:rPr lang="en-US" dirty="0" smtClean="0"/>
+              <a:t>: an online merchant that focuses on books</a:t>
+            </a:r>
+          </a:p>
+          <a:p>
+            <a:r>
+              <a:rPr lang="en-US" dirty="0" smtClean="0"/>
+              <a:t>Visual metaphor reinforces the theme</a:t>
+            </a:r>
+          </a:p>
+          <a:p>
+            <a:endParaRPr lang="en-US" dirty="0"/>
           </a:p>
         </p:txBody>
       </p:sp>
     </p:spTree>
     <p:extLst>
       <p:ext uri="{BB962C8B-B14F-4D97-AF65-F5344CB8AC3E}">
-        <p14:creationId xmlns:p14="http://schemas.microsoft.com/office/powerpoint/2010/main" val="3243312641"/>
+        <p14:creationId xmlns:p14="http://schemas.microsoft.com/office/powerpoint/2010/main" val="3270696722"/>
       </p:ext>
     </p:extLst>
   </p:cSld>
   <p:clrMapOvr>
     <a:masterClrMapping/>
   </p:clrMapOvr>
+  <p:timing>
+    <p:tnLst>
+      <p:par>
+        <p:cTn xmlns:p14="http://schemas.microsoft.com/office/powerpoint/2010/main" id="1" dur="indefinite" restart="never" nodeType="tmRoot"/>
+      </p:par>
+    </p:tnLst>
+  </p:timing>
 </p:sld>
 </file>
 
@@ -13593,7 +13980,7 @@
           <a:p>
             <a:r>
               <a:rPr lang="en-US" dirty="0" smtClean="0"/>
-              <a:t>Develop Theme</a:t>
+              <a:t>Brainstorming</a:t>
             </a:r>
             <a:endParaRPr lang="en-US" dirty="0"/>
           </a:p>
@@ -13616,67 +14003,51 @@
           <a:p>
             <a:r>
               <a:rPr lang="en-US" dirty="0" smtClean="0"/>
-              <a:t>Choose some color palettes</a:t>
-            </a:r>
-          </a:p>
-          <a:p>
-            <a:pPr lvl="1"/>
-            <a:r>
-              <a:rPr lang="en-US" dirty="0">
-                <a:hlinkClick r:id="rId2"/>
-              </a:rPr>
-              <a:t>http://colorschemedesigner.com</a:t>
-            </a:r>
-            <a:r>
-              <a:rPr lang="en-US" dirty="0" smtClean="0">
-                <a:hlinkClick r:id="rId2"/>
-              </a:rPr>
-              <a:t>/</a:t>
-            </a:r>
-            <a:r>
-              <a:rPr lang="en-US" dirty="0" smtClean="0"/>
-              <a:t> </a:t>
-            </a:r>
-          </a:p>
-          <a:p>
-            <a:r>
-              <a:rPr lang="en-US" dirty="0" smtClean="0"/>
-              <a:t>Design layouts based on content</a:t>
-            </a:r>
-          </a:p>
-          <a:p>
-            <a:pPr lvl="1"/>
-            <a:r>
-              <a:rPr lang="en-US" dirty="0" smtClean="0"/>
-              <a:t>Paper</a:t>
-            </a:r>
-          </a:p>
-          <a:p>
-            <a:pPr lvl="1"/>
-            <a:r>
-              <a:rPr lang="en-US" dirty="0" smtClean="0"/>
-              <a:t>Illustrator / Photoshop</a:t>
-            </a:r>
-          </a:p>
-          <a:p>
-            <a:r>
-              <a:rPr lang="en-US" dirty="0" smtClean="0"/>
-              <a:t>Use visual elements to reinforce the theme</a:t>
-            </a:r>
-            <a:endParaRPr lang="en-US" dirty="0"/>
+              <a:t>Helps develop visual metaphor</a:t>
+            </a:r>
+          </a:p>
+          <a:p>
+            <a:r>
+              <a:rPr lang="en-US" dirty="0" smtClean="0"/>
+              <a:t>Free-flow writing of ideas and thoughts</a:t>
+            </a:r>
+          </a:p>
+          <a:p>
+            <a:r>
+              <a:rPr lang="en-US" dirty="0" smtClean="0"/>
+              <a:t>Don't hold back; write everything</a:t>
+            </a:r>
+          </a:p>
+          <a:p>
+            <a:r>
+              <a:rPr lang="en-US" dirty="0" smtClean="0"/>
+              <a:t>Can be done several times for </a:t>
+            </a:r>
+            <a:r>
+              <a:rPr lang="en-US" smtClean="0"/>
+              <a:t>one project</a:t>
+            </a:r>
+            <a:endParaRPr lang="en-US"/>
           </a:p>
         </p:txBody>
       </p:sp>
     </p:spTree>
     <p:extLst>
       <p:ext uri="{BB962C8B-B14F-4D97-AF65-F5344CB8AC3E}">
-        <p14:creationId xmlns:p14="http://schemas.microsoft.com/office/powerpoint/2010/main" val="3037931721"/>
+        <p14:creationId xmlns:p14="http://schemas.microsoft.com/office/powerpoint/2010/main" val="3243312641"/>
       </p:ext>
     </p:extLst>
   </p:cSld>
   <p:clrMapOvr>
     <a:masterClrMapping/>
   </p:clrMapOvr>
+  <p:timing>
+    <p:tnLst>
+      <p:par>
+        <p:cTn xmlns:p14="http://schemas.microsoft.com/office/powerpoint/2010/main" id="1" dur="indefinite" restart="never" nodeType="tmRoot"/>
+      </p:par>
+    </p:tnLst>
+  </p:timing>
 </p:sld>
 </file>
 
@@ -13714,7 +14085,7 @@
           <a:p>
             <a:r>
               <a:rPr lang="en-US" dirty="0" smtClean="0"/>
-              <a:t>Interface Elements</a:t>
+              <a:t>Develop Theme</a:t>
             </a:r>
             <a:endParaRPr lang="en-US" dirty="0"/>
           </a:p>
@@ -13732,44 +14103,57 @@
         </p:nvSpPr>
         <p:spPr/>
         <p:txBody>
-          <a:bodyPr>
-            <a:normAutofit/>
-          </a:bodyPr>
-          <a:lstStyle/>
-          <a:p>
-            <a:r>
-              <a:rPr lang="en-US" dirty="0" smtClean="0"/>
-              <a:t>content – holds main text and images for page</a:t>
-            </a:r>
-          </a:p>
-          <a:p>
-            <a:r>
-              <a:rPr lang="en-US" dirty="0" smtClean="0"/>
-              <a:t>main navigation – important navigation</a:t>
-            </a:r>
-          </a:p>
-          <a:p>
-            <a:r>
-              <a:rPr lang="en-US" dirty="0" smtClean="0"/>
-              <a:t>sub navigation – navigation important, but not enough to be main</a:t>
-            </a:r>
-          </a:p>
-          <a:p>
-            <a:r>
-              <a:rPr lang="en-US" dirty="0" smtClean="0"/>
-              <a:t>sidebar – columns of html around content</a:t>
-            </a:r>
-          </a:p>
-          <a:p>
-            <a:r>
-              <a:rPr lang="en-US" dirty="0" smtClean="0"/>
-              <a:t>footer – block of html below content</a:t>
-            </a:r>
-          </a:p>
-          <a:p>
-            <a:r>
-              <a:rPr lang="en-US" dirty="0" smtClean="0"/>
-              <a:t>whitespace – negative space</a:t>
+          <a:bodyPr/>
+          <a:lstStyle/>
+          <a:p>
+            <a:r>
+              <a:rPr lang="en-US" dirty="0" smtClean="0"/>
+              <a:t>Choose some color palettes</a:t>
+            </a:r>
+          </a:p>
+          <a:p>
+            <a:pPr lvl="1"/>
+            <a:r>
+              <a:rPr lang="en-US" dirty="0">
+                <a:hlinkClick r:id="rId2"/>
+              </a:rPr>
+              <a:t>http://colorschemedesigner.com</a:t>
+            </a:r>
+            <a:r>
+              <a:rPr lang="en-US" dirty="0" smtClean="0">
+                <a:hlinkClick r:id="rId2"/>
+              </a:rPr>
+              <a:t>/</a:t>
+            </a:r>
+            <a:r>
+              <a:rPr lang="en-US" dirty="0" smtClean="0"/>
+              <a:t> </a:t>
+            </a:r>
+          </a:p>
+          <a:p>
+            <a:r>
+              <a:rPr lang="en-US" dirty="0" smtClean="0"/>
+              <a:t>Design layouts based on content</a:t>
+            </a:r>
+          </a:p>
+          <a:p>
+            <a:pPr lvl="1"/>
+            <a:r>
+              <a:rPr lang="en-US" dirty="0" smtClean="0"/>
+              <a:t>Paper</a:t>
+            </a:r>
+          </a:p>
+          <a:p>
+            <a:pPr lvl="1"/>
+            <a:r>
+              <a:rPr lang="en-US" dirty="0" smtClean="0"/>
+              <a:t>Illustrator / Photoshop</a:t>
+            </a:r>
+          </a:p>
+          <a:p>
+            <a:r>
+              <a:rPr lang="en-US" dirty="0" smtClean="0"/>
+              <a:t>Use visual elements to reinforce the theme</a:t>
             </a:r>
             <a:endParaRPr lang="en-US" dirty="0"/>
           </a:p>
@@ -13778,13 +14162,20 @@
     </p:spTree>
     <p:extLst>
       <p:ext uri="{BB962C8B-B14F-4D97-AF65-F5344CB8AC3E}">
-        <p14:creationId xmlns:p14="http://schemas.microsoft.com/office/powerpoint/2010/main" val="12080975"/>
+        <p14:creationId xmlns:p14="http://schemas.microsoft.com/office/powerpoint/2010/main" val="3037931721"/>
       </p:ext>
     </p:extLst>
   </p:cSld>
   <p:clrMapOvr>
     <a:masterClrMapping/>
   </p:clrMapOvr>
+  <p:timing>
+    <p:tnLst>
+      <p:par>
+        <p:cTn xmlns:p14="http://schemas.microsoft.com/office/powerpoint/2010/main" id="1" dur="indefinite" restart="never" nodeType="tmRoot"/>
+      </p:par>
+    </p:tnLst>
+  </p:timing>
 </p:sld>
 </file>
 
@@ -13807,7 +14198,7 @@
       </p:grpSpPr>
       <p:sp>
         <p:nvSpPr>
-          <p:cNvPr id="4" name="Title 3"/>
+          <p:cNvPr id="2" name="Title 1"/>
           <p:cNvSpPr>
             <a:spLocks noGrp="1"/>
           </p:cNvSpPr>
@@ -13817,240 +14208,67 @@
         </p:nvSpPr>
         <p:spPr/>
         <p:txBody>
+          <a:bodyPr/>
+          <a:lstStyle/>
+          <a:p>
+            <a:r>
+              <a:rPr lang="en-US" dirty="0" smtClean="0"/>
+              <a:t>Interface Elements</a:t>
+            </a:r>
+            <a:endParaRPr lang="en-US" dirty="0"/>
+          </a:p>
+        </p:txBody>
+      </p:sp>
+      <p:sp>
+        <p:nvSpPr>
+          <p:cNvPr id="3" name="Content Placeholder 2"/>
+          <p:cNvSpPr>
+            <a:spLocks noGrp="1"/>
+          </p:cNvSpPr>
+          <p:nvPr>
+            <p:ph idx="1"/>
+          </p:nvPr>
+        </p:nvSpPr>
+        <p:spPr/>
+        <p:txBody>
           <a:bodyPr>
-            <a:normAutofit fontScale="90000"/>
+            <a:normAutofit/>
           </a:bodyPr>
           <a:lstStyle/>
           <a:p>
             <a:r>
               <a:rPr lang="en-US" dirty="0" smtClean="0"/>
-              <a:t>Exercise &amp; Activity</a:t>
-            </a:r>
-            <a:endParaRPr lang="en-US" dirty="0"/>
-          </a:p>
-        </p:txBody>
-      </p:sp>
-      <p:sp>
-        <p:nvSpPr>
-          <p:cNvPr id="5" name="Text Placeholder 4"/>
-          <p:cNvSpPr>
-            <a:spLocks noGrp="1"/>
-          </p:cNvSpPr>
-          <p:nvPr>
-            <p:ph type="body" idx="1"/>
-          </p:nvPr>
-        </p:nvSpPr>
-        <p:spPr/>
-        <p:txBody>
-          <a:bodyPr/>
-          <a:lstStyle/>
-          <a:p>
-            <a:r>
-              <a:rPr lang="en-US" dirty="0" err="1" smtClean="0"/>
-              <a:t>Excercise</a:t>
-            </a:r>
-            <a:endParaRPr lang="en-US" dirty="0"/>
-          </a:p>
-        </p:txBody>
-      </p:sp>
-      <p:sp>
-        <p:nvSpPr>
-          <p:cNvPr id="6" name="Text Placeholder 5"/>
-          <p:cNvSpPr>
-            <a:spLocks noGrp="1"/>
-          </p:cNvSpPr>
-          <p:nvPr>
-            <p:ph type="body" sz="quarter" idx="3"/>
-          </p:nvPr>
-        </p:nvSpPr>
-        <p:spPr/>
-        <p:txBody>
-          <a:bodyPr/>
-          <a:lstStyle/>
-          <a:p>
-            <a:r>
-              <a:rPr lang="en-US" dirty="0" smtClean="0"/>
-              <a:t>Activity</a:t>
-            </a:r>
-            <a:endParaRPr lang="en-US" dirty="0"/>
-          </a:p>
-        </p:txBody>
-      </p:sp>
-      <p:sp>
-        <p:nvSpPr>
-          <p:cNvPr id="7" name="Content Placeholder 6"/>
-          <p:cNvSpPr>
-            <a:spLocks noGrp="1"/>
-          </p:cNvSpPr>
-          <p:nvPr>
-            <p:ph sz="quarter" idx="13"/>
-          </p:nvPr>
-        </p:nvSpPr>
-        <p:spPr/>
-        <p:txBody>
-          <a:bodyPr/>
-          <a:lstStyle/>
-          <a:p>
-            <a:pPr>
-              <a:buFont typeface="Wingdings" charset="2"/>
-              <a:buChar char="v"/>
-            </a:pPr>
-            <a:r>
-              <a:rPr lang="en-US" dirty="0" smtClean="0"/>
-              <a:t>Visual Metaphor: </a:t>
-            </a:r>
-            <a:r>
-              <a:rPr lang="en-US" dirty="0" smtClean="0">
-                <a:hlinkClick r:id="rId3"/>
-              </a:rPr>
-              <a:t>http://google.com</a:t>
-            </a:r>
-            <a:r>
-              <a:rPr lang="en-US" dirty="0" smtClean="0"/>
-              <a:t> </a:t>
-            </a:r>
-          </a:p>
-          <a:p>
-            <a:r>
-              <a:rPr lang="en-US" dirty="0" smtClean="0"/>
-              <a:t>Theme</a:t>
-            </a:r>
-            <a:r>
-              <a:rPr lang="en-US" dirty="0"/>
-              <a:t>: </a:t>
-            </a:r>
-            <a:r>
-              <a:rPr lang="en-US" dirty="0">
-                <a:hlinkClick r:id="rId4"/>
-              </a:rPr>
-              <a:t>http://www.usiouxfalls.edu</a:t>
-            </a:r>
-            <a:r>
-              <a:rPr lang="en-US" dirty="0" smtClean="0">
-                <a:hlinkClick r:id="rId4"/>
-              </a:rPr>
-              <a:t>/</a:t>
-            </a:r>
-            <a:r>
-              <a:rPr lang="en-US" dirty="0" smtClean="0"/>
-              <a:t> </a:t>
-            </a:r>
-          </a:p>
-          <a:p>
-            <a:r>
-              <a:rPr lang="en-US" dirty="0" smtClean="0"/>
-              <a:t>Interface elements</a:t>
-            </a:r>
-            <a:r>
-              <a:rPr lang="en-US" dirty="0"/>
-              <a:t>: </a:t>
-            </a:r>
-            <a:r>
-              <a:rPr lang="en-US" dirty="0">
-                <a:hlinkClick r:id="rId5"/>
-              </a:rPr>
-              <a:t>http://www.apple.com</a:t>
-            </a:r>
-            <a:r>
-              <a:rPr lang="en-US" dirty="0" smtClean="0">
-                <a:hlinkClick r:id="rId5"/>
-              </a:rPr>
-              <a:t>/</a:t>
-            </a:r>
-            <a:r>
-              <a:rPr lang="en-US" dirty="0" smtClean="0"/>
-              <a:t> </a:t>
-            </a:r>
-            <a:endParaRPr lang="en-US" dirty="0"/>
-          </a:p>
-        </p:txBody>
-      </p:sp>
-      <p:sp>
-        <p:nvSpPr>
-          <p:cNvPr id="8" name="Content Placeholder 7"/>
-          <p:cNvSpPr>
-            <a:spLocks noGrp="1"/>
-          </p:cNvSpPr>
-          <p:nvPr>
-            <p:ph sz="quarter" idx="14"/>
-          </p:nvPr>
-        </p:nvSpPr>
-        <p:spPr/>
-        <p:txBody>
-          <a:bodyPr/>
-          <a:lstStyle/>
-          <a:p>
-            <a:r>
-              <a:rPr lang="en-US" dirty="0" smtClean="0"/>
-              <a:t>Visual Metaphor</a:t>
-            </a:r>
-            <a:r>
-              <a:rPr lang="en-US" dirty="0"/>
-              <a:t>: </a:t>
-            </a:r>
-            <a:r>
-              <a:rPr lang="en-US" dirty="0">
-                <a:hlinkClick r:id="rId6"/>
-              </a:rPr>
-              <a:t>http://www.bing.com</a:t>
-            </a:r>
-            <a:r>
-              <a:rPr lang="en-US" dirty="0" smtClean="0">
-                <a:hlinkClick r:id="rId6"/>
-              </a:rPr>
-              <a:t>/</a:t>
-            </a:r>
-            <a:r>
-              <a:rPr lang="en-US" dirty="0" smtClean="0"/>
-              <a:t> </a:t>
-            </a:r>
-          </a:p>
-          <a:p>
-            <a:r>
-              <a:rPr lang="en-US" dirty="0" smtClean="0"/>
-              <a:t>Theme</a:t>
-            </a:r>
-            <a:r>
-              <a:rPr lang="en-US" dirty="0"/>
-              <a:t>: </a:t>
-            </a:r>
-            <a:r>
-              <a:rPr lang="en-US" dirty="0">
-                <a:hlinkClick r:id="rId7"/>
-              </a:rPr>
-              <a:t>http://l-s.com</a:t>
-            </a:r>
-            <a:r>
-              <a:rPr lang="en-US" dirty="0" smtClean="0">
-                <a:hlinkClick r:id="rId7"/>
-              </a:rPr>
-              <a:t>/</a:t>
-            </a:r>
-            <a:r>
-              <a:rPr lang="en-US" dirty="0" smtClean="0"/>
-              <a:t> </a:t>
-            </a:r>
-          </a:p>
-          <a:p>
-            <a:r>
-              <a:rPr lang="en-US" dirty="0"/>
-              <a:t>Interface elements: </a:t>
-            </a:r>
-            <a:r>
-              <a:rPr lang="en-US" dirty="0">
-                <a:hlinkClick r:id="rId8"/>
-              </a:rPr>
-              <a:t>http://</a:t>
-            </a:r>
-            <a:r>
-              <a:rPr lang="en-US" dirty="0" smtClean="0">
-                <a:hlinkClick r:id="rId8"/>
-              </a:rPr>
-              <a:t>www.microsoft.com</a:t>
-            </a:r>
-            <a:r>
-              <a:rPr lang="en-US" dirty="0" smtClean="0"/>
-              <a:t> </a:t>
+              <a:t>content – holds main text and images for page</a:t>
+            </a:r>
+          </a:p>
+          <a:p>
+            <a:r>
+              <a:rPr lang="en-US" dirty="0" smtClean="0"/>
+              <a:t>main navigation – important navigation</a:t>
+            </a:r>
+          </a:p>
+          <a:p>
+            <a:r>
+              <a:rPr lang="en-US" dirty="0" smtClean="0"/>
+              <a:t>sub navigation – navigation important, but not enough to be main</a:t>
+            </a:r>
+          </a:p>
+          <a:p>
+            <a:r>
+              <a:rPr lang="en-US" dirty="0" smtClean="0"/>
+              <a:t>sidebar – columns of html around content</a:t>
+            </a:r>
+          </a:p>
+          <a:p>
+            <a:r>
+              <a:rPr lang="en-US" dirty="0" smtClean="0"/>
+              <a:t>footer – block of html below content</a:t>
+            </a:r>
+          </a:p>
+          <a:p>
+            <a:r>
+              <a:rPr lang="en-US" dirty="0" smtClean="0"/>
+              <a:t>whitespace – negative space</a:t>
             </a:r>
             <a:endParaRPr lang="en-US" dirty="0"/>
           </a:p>
@@ -14059,7 +14277,7 @@
     </p:spTree>
     <p:extLst>
       <p:ext uri="{BB962C8B-B14F-4D97-AF65-F5344CB8AC3E}">
-        <p14:creationId xmlns:p14="http://schemas.microsoft.com/office/powerpoint/2010/main" val="1667360370"/>
+        <p14:creationId xmlns:p14="http://schemas.microsoft.com/office/powerpoint/2010/main" val="12080975"/>
       </p:ext>
     </p:extLst>
   </p:cSld>
@@ -14095,7 +14313,7 @@
       </p:grpSpPr>
       <p:sp>
         <p:nvSpPr>
-          <p:cNvPr id="9" name="Title 8"/>
+          <p:cNvPr id="4" name="Title 3"/>
           <p:cNvSpPr>
             <a:spLocks noGrp="1"/>
           </p:cNvSpPr>
@@ -14105,12 +14323,37 @@
         </p:nvSpPr>
         <p:spPr/>
         <p:txBody>
+          <a:bodyPr>
+            <a:normAutofit fontScale="90000"/>
+          </a:bodyPr>
+          <a:lstStyle/>
+          <a:p>
+            <a:r>
+              <a:rPr lang="en-US" dirty="0" smtClean="0"/>
+              <a:t>Exercise &amp; Activity</a:t>
+            </a:r>
+            <a:endParaRPr lang="en-US" dirty="0"/>
+          </a:p>
+        </p:txBody>
+      </p:sp>
+      <p:sp>
+        <p:nvSpPr>
+          <p:cNvPr id="5" name="Text Placeholder 4"/>
+          <p:cNvSpPr>
+            <a:spLocks noGrp="1"/>
+          </p:cNvSpPr>
+          <p:nvPr>
+            <p:ph type="body" idx="1"/>
+          </p:nvPr>
+        </p:nvSpPr>
+        <p:spPr/>
+        <p:txBody>
           <a:bodyPr/>
           <a:lstStyle/>
           <a:p>
             <a:r>
-              <a:rPr lang="en-US" dirty="0" smtClean="0"/>
-              <a:t>Class Four</a:t>
+              <a:rPr lang="en-US" dirty="0" err="1" smtClean="0"/>
+              <a:t>Excercise</a:t>
             </a:r>
             <a:endParaRPr lang="en-US" dirty="0"/>
           </a:p>
@@ -14118,12 +14361,12 @@
       </p:sp>
       <p:sp>
         <p:nvSpPr>
-          <p:cNvPr id="10" name="Text Placeholder 9"/>
-          <p:cNvSpPr>
-            <a:spLocks noGrp="1"/>
-          </p:cNvSpPr>
-          <p:nvPr>
-            <p:ph type="body" idx="1"/>
+          <p:cNvPr id="6" name="Text Placeholder 5"/>
+          <p:cNvSpPr>
+            <a:spLocks noGrp="1"/>
+          </p:cNvSpPr>
+          <p:nvPr>
+            <p:ph type="body" sz="quarter" idx="3"/>
           </p:nvPr>
         </p:nvSpPr>
         <p:spPr/>
@@ -14133,19 +14376,20 @@
           <a:p>
             <a:r>
               <a:rPr lang="en-US" dirty="0" smtClean="0"/>
-              <a:t>Pre-production (Part II)</a:t>
-            </a:r>
-          </a:p>
-        </p:txBody>
-      </p:sp>
-      <p:sp>
-        <p:nvSpPr>
-          <p:cNvPr id="11" name="Footer Placeholder 10"/>
-          <p:cNvSpPr>
-            <a:spLocks noGrp="1"/>
-          </p:cNvSpPr>
-          <p:nvPr>
-            <p:ph type="ftr" sz="quarter" idx="11"/>
+              <a:t>Activity</a:t>
+            </a:r>
+            <a:endParaRPr lang="en-US" dirty="0"/>
+          </a:p>
+        </p:txBody>
+      </p:sp>
+      <p:sp>
+        <p:nvSpPr>
+          <p:cNvPr id="7" name="Content Placeholder 6"/>
+          <p:cNvSpPr>
+            <a:spLocks noGrp="1"/>
+          </p:cNvSpPr>
+          <p:nvPr>
+            <p:ph sz="quarter" idx="13"/>
           </p:nvPr>
         </p:nvSpPr>
         <p:spPr/>
@@ -14153,31 +14397,166 @@
           <a:bodyPr/>
           <a:lstStyle/>
           <a:p>
-            <a:r>
-              <a:rPr lang="en-US" dirty="0" smtClean="0"/>
-              <a:t>Assignment</a:t>
+            <a:pPr>
+              <a:buFont typeface="Wingdings" charset="2"/>
+              <a:buChar char="v"/>
+            </a:pPr>
+            <a:r>
+              <a:rPr lang="en-US" dirty="0" smtClean="0"/>
+              <a:t>Visual Metaphor: </a:t>
+            </a:r>
+            <a:r>
+              <a:rPr lang="en-US" dirty="0" smtClean="0">
+                <a:hlinkClick r:id="rId3"/>
+              </a:rPr>
+              <a:t>http://google.com</a:t>
+            </a:r>
+            <a:r>
+              <a:rPr lang="en-US" dirty="0" smtClean="0"/>
+              <a:t> </a:t>
+            </a:r>
+          </a:p>
+          <a:p>
+            <a:r>
+              <a:rPr lang="en-US" dirty="0" smtClean="0"/>
+              <a:t>Theme</a:t>
             </a:r>
             <a:r>
               <a:rPr lang="en-US" dirty="0"/>
-              <a:t>: Read Chapter 2 (pages </a:t>
-            </a:r>
-            <a:r>
-              <a:rPr lang="en-US" dirty="0" smtClean="0"/>
-              <a:t>56 </a:t>
+              <a:t>: </a:t>
+            </a:r>
+            <a:r>
+              <a:rPr lang="en-US" dirty="0">
+                <a:hlinkClick r:id="rId4"/>
+              </a:rPr>
+              <a:t>http://www.usiouxfalls.edu</a:t>
+            </a:r>
+            <a:r>
+              <a:rPr lang="en-US" dirty="0" smtClean="0">
+                <a:hlinkClick r:id="rId4"/>
+              </a:rPr>
+              <a:t>/</a:t>
+            </a:r>
+            <a:r>
+              <a:rPr lang="en-US" dirty="0" smtClean="0"/>
+              <a:t> </a:t>
+            </a:r>
+          </a:p>
+          <a:p>
+            <a:r>
+              <a:rPr lang="en-US" dirty="0" smtClean="0"/>
+              <a:t>Interface elements</a:t>
             </a:r>
             <a:r>
               <a:rPr lang="en-US" dirty="0"/>
-              <a:t>– </a:t>
-            </a:r>
-            <a:r>
-              <a:rPr lang="en-US" dirty="0" smtClean="0"/>
-              <a:t>67),</a:t>
-            </a:r>
-          </a:p>
-          <a:p>
-            <a:r>
-              <a:rPr lang="en-US" dirty="0" smtClean="0"/>
-              <a:t>visualize your portfolio</a:t>
+              <a:t>: </a:t>
+            </a:r>
+            <a:r>
+              <a:rPr lang="en-US" dirty="0">
+                <a:hlinkClick r:id="rId5"/>
+              </a:rPr>
+              <a:t>http://www.apple.com</a:t>
+            </a:r>
+            <a:r>
+              <a:rPr lang="en-US" dirty="0" smtClean="0">
+                <a:hlinkClick r:id="rId5"/>
+              </a:rPr>
+              <a:t>/</a:t>
+            </a:r>
+            <a:r>
+              <a:rPr lang="en-US" dirty="0" smtClean="0"/>
+              <a:t> </a:t>
+            </a:r>
+            <a:endParaRPr lang="en-US" dirty="0"/>
+          </a:p>
+        </p:txBody>
+      </p:sp>
+      <p:sp>
+        <p:nvSpPr>
+          <p:cNvPr id="8" name="Content Placeholder 7"/>
+          <p:cNvSpPr>
+            <a:spLocks noGrp="1"/>
+          </p:cNvSpPr>
+          <p:nvPr>
+            <p:ph sz="quarter" idx="14"/>
+          </p:nvPr>
+        </p:nvSpPr>
+        <p:spPr/>
+        <p:txBody>
+          <a:bodyPr/>
+          <a:lstStyle/>
+          <a:p>
+            <a:r>
+              <a:rPr lang="en-US" dirty="0" smtClean="0"/>
+              <a:t>Visual Metaphor</a:t>
+            </a:r>
+            <a:r>
+              <a:rPr lang="en-US" dirty="0"/>
+              <a:t>: </a:t>
+            </a:r>
+            <a:r>
+              <a:rPr lang="en-US" dirty="0">
+                <a:hlinkClick r:id="rId6"/>
+              </a:rPr>
+              <a:t>http://www.bing.com</a:t>
+            </a:r>
+            <a:r>
+              <a:rPr lang="en-US" dirty="0" smtClean="0">
+                <a:hlinkClick r:id="rId6"/>
+              </a:rPr>
+              <a:t>/</a:t>
+            </a:r>
+            <a:r>
+              <a:rPr lang="en-US" dirty="0" smtClean="0"/>
+              <a:t> </a:t>
+            </a:r>
+          </a:p>
+          <a:p>
+            <a:r>
+              <a:rPr lang="en-US" dirty="0" smtClean="0"/>
+              <a:t>Theme</a:t>
+            </a:r>
+            <a:r>
+              <a:rPr lang="en-US" dirty="0"/>
+              <a:t>: </a:t>
+            </a:r>
+            <a:r>
+              <a:rPr lang="en-US" dirty="0">
+                <a:hlinkClick r:id="rId7"/>
+              </a:rPr>
+              <a:t>http://l-s.com</a:t>
+            </a:r>
+            <a:r>
+              <a:rPr lang="en-US" dirty="0" smtClean="0">
+                <a:hlinkClick r:id="rId7"/>
+              </a:rPr>
+              <a:t>/</a:t>
+            </a:r>
+            <a:r>
+              <a:rPr lang="en-US" dirty="0" smtClean="0"/>
+              <a:t> </a:t>
+            </a:r>
+          </a:p>
+          <a:p>
+            <a:r>
+              <a:rPr lang="en-US" dirty="0"/>
+              <a:t>Interface elements: </a:t>
+            </a:r>
+            <a:r>
+              <a:rPr lang="en-US" dirty="0">
+                <a:hlinkClick r:id="rId8"/>
+              </a:rPr>
+              <a:t>http://</a:t>
+            </a:r>
+            <a:r>
+              <a:rPr lang="en-US" dirty="0" smtClean="0">
+                <a:hlinkClick r:id="rId8"/>
+              </a:rPr>
+              <a:t>www.microsoft.com</a:t>
+            </a:r>
+            <a:r>
+              <a:rPr lang="en-US" dirty="0" smtClean="0"/>
+              <a:t> </a:t>
             </a:r>
             <a:endParaRPr lang="en-US" dirty="0"/>
           </a:p>
@@ -14186,7 +14565,7 @@
     </p:spTree>
     <p:extLst>
       <p:ext uri="{BB962C8B-B14F-4D97-AF65-F5344CB8AC3E}">
-        <p14:creationId xmlns:p14="http://schemas.microsoft.com/office/powerpoint/2010/main" val="472547524"/>
+        <p14:creationId xmlns:p14="http://schemas.microsoft.com/office/powerpoint/2010/main" val="1667360370"/>
       </p:ext>
     </p:extLst>
   </p:cSld>
@@ -14293,7 +14672,6 @@
               <a:rPr lang="en-US" dirty="0" smtClean="0"/>
               <a:t> </a:t>
             </a:r>
-            <a:endParaRPr lang="en-US" dirty="0" smtClean="0"/>
           </a:p>
           <a:p>
             <a:r>
@@ -14307,7 +14685,72 @@
               <a:t>http://hyvee.com</a:t>
             </a:r>
             <a:r>
-              <a:rPr lang="en-US" smtClean="0"/>
+              <a:rPr lang="en-US" dirty="0" smtClean="0"/>
+              <a:t> </a:t>
+            </a:r>
+            <a:endParaRPr lang="en-US" dirty="0" smtClean="0"/>
+          </a:p>
+          <a:p>
+            <a:r>
+              <a:rPr lang="en-US" dirty="0" smtClean="0"/>
+              <a:t>Sam – </a:t>
+            </a:r>
+            <a:r>
+              <a:rPr lang="en-US" dirty="0" smtClean="0">
+                <a:hlinkClick r:id="rId6"/>
+              </a:rPr>
+              <a:t>http://yahoo.com</a:t>
+            </a:r>
+            <a:r>
+              <a:rPr lang="en-US" dirty="0" smtClean="0"/>
+              <a:t> </a:t>
+            </a:r>
+          </a:p>
+          <a:p>
+            <a:r>
+              <a:rPr lang="en-US" dirty="0" smtClean="0"/>
+              <a:t>Kendra – </a:t>
+            </a:r>
+            <a:r>
+              <a:rPr lang="en-US" dirty="0" smtClean="0">
+                <a:hlinkClick r:id="rId7"/>
+              </a:rPr>
+              <a:t>http://peacelight.com</a:t>
+            </a:r>
+            <a:r>
+              <a:rPr lang="en-US" dirty="0" smtClean="0"/>
+              <a:t> </a:t>
+            </a:r>
+          </a:p>
+          <a:p>
+            <a:r>
+              <a:rPr lang="en-US" dirty="0" smtClean="0"/>
+              <a:t>Leah – </a:t>
+            </a:r>
+            <a:r>
+              <a:rPr lang="en-US" dirty="0" smtClean="0">
+                <a:hlinkClick r:id="rId8"/>
+              </a:rPr>
+              <a:t>http://mapmyrun.com</a:t>
+            </a:r>
+            <a:r>
+              <a:rPr lang="en-US" dirty="0" smtClean="0"/>
+              <a:t> </a:t>
+            </a:r>
+          </a:p>
+          <a:p>
+            <a:r>
+              <a:rPr lang="en-US" dirty="0" smtClean="0"/>
+              <a:t>Beth – </a:t>
+            </a:r>
+            <a:r>
+              <a:rPr lang="en-US" dirty="0" smtClean="0">
+                <a:hlinkClick r:id="rId9"/>
+              </a:rPr>
+              <a:t>http://iwastesomuchtime.com</a:t>
+            </a:r>
+            <a:r>
+              <a:rPr lang="en-US" dirty="0" smtClean="0"/>
               <a:t> </a:t>
             </a:r>
             <a:endParaRPr lang="en-US" dirty="0" smtClean="0"/>
@@ -14319,13 +14762,13 @@
             </a:r>
             <a:r>
               <a:rPr lang="en-US" dirty="0">
-                <a:hlinkClick r:id="rId6"/>
+                <a:hlinkClick r:id="rId10"/>
               </a:rPr>
               <a:t>http://thewildernessdowntown.com</a:t>
             </a:r>
             <a:r>
               <a:rPr lang="en-US" dirty="0" smtClean="0">
-                <a:hlinkClick r:id="rId6"/>
+                <a:hlinkClick r:id="rId10"/>
               </a:rPr>
               <a:t>/</a:t>
             </a:r>
@@ -14341,6 +14784,133 @@
     <p:extLst>
       <p:ext uri="{BB962C8B-B14F-4D97-AF65-F5344CB8AC3E}">
         <p14:creationId xmlns:p14="http://schemas.microsoft.com/office/powerpoint/2010/main" val="2577880583"/>
+      </p:ext>
+    </p:extLst>
+  </p:cSld>
+  <p:clrMapOvr>
+    <a:masterClrMapping/>
+  </p:clrMapOvr>
+  <p:timing>
+    <p:tnLst>
+      <p:par>
+        <p:cTn xmlns:p14="http://schemas.microsoft.com/office/powerpoint/2010/main" id="1" dur="indefinite" restart="never" nodeType="tmRoot"/>
+      </p:par>
+    </p:tnLst>
+  </p:timing>
+</p:sld>
+</file>
+
+<file path=ppt/slides/slide40.xml><?xml version="1.0" encoding="utf-8"?>
+<p:sld xmlns:a="http://schemas.openxmlformats.org/drawingml/2006/main" xmlns:r="http://schemas.openxmlformats.org/officeDocument/2006/relationships" xmlns:p="http://schemas.openxmlformats.org/presentationml/2006/main">
+  <p:cSld>
+    <p:spTree>
+      <p:nvGrpSpPr>
+        <p:cNvPr id="1" name=""/>
+        <p:cNvGrpSpPr/>
+        <p:nvPr/>
+      </p:nvGrpSpPr>
+      <p:grpSpPr>
+        <a:xfrm>
+          <a:off x="0" y="0"/>
+          <a:ext cx="0" cy="0"/>
+          <a:chOff x="0" y="0"/>
+          <a:chExt cx="0" cy="0"/>
+        </a:xfrm>
+      </p:grpSpPr>
+      <p:sp>
+        <p:nvSpPr>
+          <p:cNvPr id="9" name="Title 8"/>
+          <p:cNvSpPr>
+            <a:spLocks noGrp="1"/>
+          </p:cNvSpPr>
+          <p:nvPr>
+            <p:ph type="title"/>
+          </p:nvPr>
+        </p:nvSpPr>
+        <p:spPr/>
+        <p:txBody>
+          <a:bodyPr/>
+          <a:lstStyle/>
+          <a:p>
+            <a:r>
+              <a:rPr lang="en-US" dirty="0" smtClean="0"/>
+              <a:t>Class Four</a:t>
+            </a:r>
+            <a:endParaRPr lang="en-US" dirty="0"/>
+          </a:p>
+        </p:txBody>
+      </p:sp>
+      <p:sp>
+        <p:nvSpPr>
+          <p:cNvPr id="10" name="Text Placeholder 9"/>
+          <p:cNvSpPr>
+            <a:spLocks noGrp="1"/>
+          </p:cNvSpPr>
+          <p:nvPr>
+            <p:ph type="body" idx="1"/>
+          </p:nvPr>
+        </p:nvSpPr>
+        <p:spPr/>
+        <p:txBody>
+          <a:bodyPr/>
+          <a:lstStyle/>
+          <a:p>
+            <a:r>
+              <a:rPr lang="en-US" dirty="0" smtClean="0"/>
+              <a:t>Pre-production (Part II)</a:t>
+            </a:r>
+          </a:p>
+        </p:txBody>
+      </p:sp>
+      <p:sp>
+        <p:nvSpPr>
+          <p:cNvPr id="11" name="Footer Placeholder 10"/>
+          <p:cNvSpPr>
+            <a:spLocks noGrp="1"/>
+          </p:cNvSpPr>
+          <p:nvPr>
+            <p:ph type="ftr" sz="quarter" idx="11"/>
+          </p:nvPr>
+        </p:nvSpPr>
+        <p:spPr/>
+        <p:txBody>
+          <a:bodyPr/>
+          <a:lstStyle/>
+          <a:p>
+            <a:r>
+              <a:rPr lang="en-US" dirty="0" smtClean="0"/>
+              <a:t>Assignment</a:t>
+            </a:r>
+            <a:r>
+              <a:rPr lang="en-US" dirty="0"/>
+              <a:t>: Read Chapter 2 (pages </a:t>
+            </a:r>
+            <a:r>
+              <a:rPr lang="en-US" dirty="0" smtClean="0"/>
+              <a:t>56 </a:t>
+            </a:r>
+            <a:r>
+              <a:rPr lang="en-US" dirty="0"/>
+              <a:t>– </a:t>
+            </a:r>
+            <a:r>
+              <a:rPr lang="en-US" dirty="0" smtClean="0"/>
+              <a:t>67),</a:t>
+            </a:r>
+          </a:p>
+          <a:p>
+            <a:r>
+              <a:rPr lang="en-US" dirty="0" smtClean="0"/>
+              <a:t>visualize your portfolio</a:t>
+            </a:r>
+            <a:endParaRPr lang="en-US" dirty="0"/>
+          </a:p>
+        </p:txBody>
+      </p:sp>
+    </p:spTree>
+    <p:extLst>
+      <p:ext uri="{BB962C8B-B14F-4D97-AF65-F5344CB8AC3E}">
+        <p14:creationId xmlns:p14="http://schemas.microsoft.com/office/powerpoint/2010/main" val="472547524"/>
       </p:ext>
     </p:extLst>
   </p:cSld>
@@ -15931,6 +16501,13 @@
   <p:clrMapOvr>
     <a:masterClrMapping/>
   </p:clrMapOvr>
+  <p:timing>
+    <p:tnLst>
+      <p:par>
+        <p:cTn xmlns:p14="http://schemas.microsoft.com/office/powerpoint/2010/main" id="1" dur="indefinite" restart="never" nodeType="tmRoot"/>
+      </p:par>
+    </p:tnLst>
+  </p:timing>
 </p:sld>
 </file>
 

</xml_diff>